<commit_message>
AmongUS assignment - added section 3.3 commit
</commit_message>
<xml_diff>
--- a/AmongUS Assignment.pptx
+++ b/AmongUS Assignment.pptx
@@ -18,6 +18,8 @@
     <p:sldId id="269" r:id="rId12"/>
     <p:sldId id="270" r:id="rId13"/>
     <p:sldId id="271" r:id="rId14"/>
+    <p:sldId id="272" r:id="rId15"/>
+    <p:sldId id="273" r:id="rId16"/>
   </p:sldIdLst>
   <p:sldSz cx="12192000" cy="6858000"/>
   <p:notesSz cx="6858000" cy="9144000"/>
@@ -4264,7 +4266,7 @@
             </a:r>
             <a:r>
               <a:rPr lang="en-US" sz="1800" dirty="0"/>
-              <a:t> AMONGUS&gt; </a:t>
+              <a:t> AMONGUS&gt;</a:t>
             </a:r>
             <a:r>
               <a:rPr lang="en-US" sz="1800" dirty="0" err="1"/>
@@ -4288,7 +4290,7 @@
             </a:r>
             <a:r>
               <a:rPr lang="en-US" sz="1800" dirty="0"/>
-              <a:t>':{ $exists: true, $ne: ''}}},{ $group: { _id: { Action: "$</a:t>
+              <a:t>':{ $regex: "End$"}}},{ $group: { _id: { Action: "$</a:t>
             </a:r>
             <a:r>
               <a:rPr lang="en-US" sz="1800" dirty="0" err="1"/>
@@ -4534,10 +4536,10 @@
       </p:sp>
       <p:pic>
         <p:nvPicPr>
-          <p:cNvPr id="7" name="Picture 6">
-            <a:extLst>
-              <a:ext uri="{FF2B5EF4-FFF2-40B4-BE49-F238E27FC236}">
-                <a16:creationId xmlns:a16="http://schemas.microsoft.com/office/drawing/2014/main" id="{C16C9B25-E976-2D55-0E03-2CAF7F7C9B01}"/>
+          <p:cNvPr id="5" name="Picture 4">
+            <a:extLst>
+              <a:ext uri="{FF2B5EF4-FFF2-40B4-BE49-F238E27FC236}">
+                <a16:creationId xmlns:a16="http://schemas.microsoft.com/office/drawing/2014/main" id="{75B3A5FB-4437-0420-1145-8703FAB9744E}"/>
               </a:ext>
             </a:extLst>
           </p:cNvPr>
@@ -4554,8 +4556,8 @@
         </p:blipFill>
         <p:spPr>
           <a:xfrm>
-            <a:off x="555008" y="4484625"/>
-            <a:ext cx="11172967" cy="1547921"/>
+            <a:off x="399769" y="4594773"/>
+            <a:ext cx="11496529" cy="1227494"/>
           </a:xfrm>
           <a:prstGeom prst="rect">
             <a:avLst/>
@@ -4695,7 +4697,7 @@
             </a:r>
             <a:r>
               <a:rPr lang="en-US" sz="1800" dirty="0"/>
-              <a:t> AMONGUS&gt; </a:t>
+              <a:t>  </a:t>
             </a:r>
             <a:r>
               <a:rPr lang="en-US" sz="1800" dirty="0" err="1"/>
@@ -4719,11 +4721,11 @@
             </a:r>
             <a:r>
               <a:rPr lang="en-US" sz="1800" dirty="0"/>
-              <a:t>':{ $exists: true, $ne: ''}}},{ $group: { _id: { Action: "$</a:t>
+              <a:t>':{$regex: "End$"}}},{ $group: { _id: { Action: "$</a:t>
             </a:r>
             <a:r>
               <a:rPr lang="en-US" sz="1800" dirty="0" err="1"/>
-              <a:t>Game_Feed.Action</a:t>
+              <a:t>Game_Feed.Map</a:t>
             </a:r>
             <a:r>
               <a:rPr lang="en-US" sz="1800" dirty="0"/>
@@ -4731,7 +4733,7 @@
             </a:r>
             <a:r>
               <a:rPr lang="en-US" sz="1800" dirty="0" err="1"/>
-              <a:t>totalwins</a:t>
+              <a:t>MatchesPlayedOnMaps</a:t>
             </a:r>
             <a:r>
               <a:rPr lang="en-US" sz="1800" dirty="0"/>
@@ -4765,7 +4767,7 @@
         </p:spPr>
         <p:txBody>
           <a:bodyPr vert="horz" lIns="91440" tIns="45720" rIns="91440" bIns="45720" rtlCol="0">
-            <a:normAutofit/>
+            <a:normAutofit lnSpcReduction="10000"/>
           </a:bodyPr>
           <a:lstStyle>
             <a:lvl1pPr marL="228600" indent="-228600" algn="l" defTabSz="914400" rtl="0" eaLnBrk="1" latinLnBrk="0" hangingPunct="1">
@@ -4938,37 +4940,65 @@
             </a:pPr>
             <a:r>
               <a:rPr lang="en-US" sz="1800" b="1" dirty="0"/>
-              <a:t>Answer –</a:t>
+              <a:t>Answer – </a:t>
+            </a:r>
+            <a:r>
+              <a:rPr lang="en-US" sz="1800" dirty="0"/>
+              <a:t># of Matches played on each map is </a:t>
             </a:r>
           </a:p>
           <a:p>
             <a:pPr marL="342900" indent="-342900">
-              <a:buFont typeface="Arial" panose="020B0604020202020204" pitchFamily="34" charset="0"/>
+              <a:buFont typeface="+mj-lt"/>
               <a:buAutoNum type="arabicPeriod"/>
             </a:pPr>
             <a:r>
               <a:rPr lang="en-US" sz="1800" dirty="0"/>
-              <a:t>Crew Wins –  323 (279+44)</a:t>
+              <a:t>The </a:t>
+            </a:r>
+            <a:r>
+              <a:rPr lang="en-US" sz="1800" dirty="0" err="1"/>
+              <a:t>Skeld</a:t>
+            </a:r>
+            <a:r>
+              <a:rPr lang="en-US" sz="1800" dirty="0"/>
+              <a:t> – 88 Matches</a:t>
             </a:r>
           </a:p>
           <a:p>
             <a:pPr marL="342900" indent="-342900">
-              <a:buFont typeface="Arial" panose="020B0604020202020204" pitchFamily="34" charset="0"/>
+              <a:buFont typeface="+mj-lt"/>
               <a:buAutoNum type="arabicPeriod"/>
             </a:pPr>
             <a:r>
               <a:rPr lang="en-US" sz="1800" dirty="0"/>
-              <a:t>Imposter Wins -   176 (2+174)</a:t>
-            </a:r>
+              <a:t>MIRA HQ – 7 Matches</a:t>
+            </a:r>
+          </a:p>
+          <a:p>
+            <a:pPr marL="342900" indent="-342900">
+              <a:buFont typeface="+mj-lt"/>
+              <a:buAutoNum type="arabicPeriod"/>
+            </a:pPr>
+            <a:r>
+              <a:rPr lang="en-US" sz="1800" dirty="0"/>
+              <a:t>Polus – 404 Matches</a:t>
+            </a:r>
+          </a:p>
+          <a:p>
+            <a:pPr marL="0" indent="0">
+              <a:buNone/>
+            </a:pPr>
+            <a:endParaRPr lang="en-US" sz="1800" b="1" dirty="0"/>
           </a:p>
         </p:txBody>
       </p:sp>
       <p:pic>
         <p:nvPicPr>
-          <p:cNvPr id="7" name="Picture 6">
-            <a:extLst>
-              <a:ext uri="{FF2B5EF4-FFF2-40B4-BE49-F238E27FC236}">
-                <a16:creationId xmlns:a16="http://schemas.microsoft.com/office/drawing/2014/main" id="{C16C9B25-E976-2D55-0E03-2CAF7F7C9B01}"/>
+          <p:cNvPr id="5" name="Picture 4">
+            <a:extLst>
+              <a:ext uri="{FF2B5EF4-FFF2-40B4-BE49-F238E27FC236}">
+                <a16:creationId xmlns:a16="http://schemas.microsoft.com/office/drawing/2014/main" id="{E28A866E-03A6-9D31-6053-C8772F34F9ED}"/>
               </a:ext>
             </a:extLst>
           </p:cNvPr>
@@ -4985,8 +5015,8 @@
         </p:blipFill>
         <p:spPr>
           <a:xfrm>
-            <a:off x="555008" y="4484625"/>
-            <a:ext cx="11172967" cy="1547921"/>
+            <a:off x="614149" y="4384967"/>
+            <a:ext cx="10963701" cy="1732431"/>
           </a:xfrm>
           <a:prstGeom prst="rect">
             <a:avLst/>
@@ -4997,6 +5027,786 @@
     <p:extLst>
       <p:ext uri="{BB962C8B-B14F-4D97-AF65-F5344CB8AC3E}">
         <p14:creationId xmlns:p14="http://schemas.microsoft.com/office/powerpoint/2010/main" val="3709743393"/>
+      </p:ext>
+    </p:extLst>
+  </p:cSld>
+  <p:clrMapOvr>
+    <a:masterClrMapping/>
+  </p:clrMapOvr>
+</p:sld>
+</file>
+
+<file path=ppt/slides/slide14.xml><?xml version="1.0" encoding="utf-8"?>
+<p:sld xmlns:a="http://schemas.openxmlformats.org/drawingml/2006/main" xmlns:r="http://schemas.openxmlformats.org/officeDocument/2006/relationships" xmlns:p="http://schemas.openxmlformats.org/presentationml/2006/main">
+  <p:cSld>
+    <p:spTree>
+      <p:nvGrpSpPr>
+        <p:cNvPr id="1" name=""/>
+        <p:cNvGrpSpPr/>
+        <p:nvPr/>
+      </p:nvGrpSpPr>
+      <p:grpSpPr>
+        <a:xfrm>
+          <a:off x="0" y="0"/>
+          <a:ext cx="0" cy="0"/>
+          <a:chOff x="0" y="0"/>
+          <a:chExt cx="0" cy="0"/>
+        </a:xfrm>
+      </p:grpSpPr>
+      <p:sp>
+        <p:nvSpPr>
+          <p:cNvPr id="4" name="TextBox 3">
+            <a:extLst>
+              <a:ext uri="{FF2B5EF4-FFF2-40B4-BE49-F238E27FC236}">
+                <a16:creationId xmlns:a16="http://schemas.microsoft.com/office/drawing/2014/main" id="{A48799DE-1563-519F-5751-7995A485ED47}"/>
+              </a:ext>
+            </a:extLst>
+          </p:cNvPr>
+          <p:cNvSpPr txBox="1"/>
+          <p:nvPr/>
+        </p:nvSpPr>
+        <p:spPr>
+          <a:xfrm>
+            <a:off x="637387" y="323529"/>
+            <a:ext cx="11304403" cy="369332"/>
+          </a:xfrm>
+          <a:prstGeom prst="rect">
+            <a:avLst/>
+          </a:prstGeom>
+          <a:noFill/>
+        </p:spPr>
+        <p:txBody>
+          <a:bodyPr wrap="square" rtlCol="0">
+            <a:spAutoFit/>
+          </a:bodyPr>
+          <a:lstStyle/>
+          <a:p>
+            <a:pPr algn="l" rtl="0"/>
+            <a:r>
+              <a:rPr lang="en-US" b="1" dirty="0"/>
+              <a:t>Question 3.4 - </a:t>
+            </a:r>
+            <a:r>
+              <a:rPr lang="en-US" b="1" i="0" dirty="0">
+                <a:solidFill>
+                  <a:srgbClr val="091E42"/>
+                </a:solidFill>
+                <a:effectLst/>
+                <a:latin typeface="freight-text-pro"/>
+              </a:rPr>
+              <a:t>Overall aggregation - </a:t>
+            </a:r>
+            <a:r>
+              <a:rPr lang="en-US" b="0" i="0" dirty="0">
+                <a:solidFill>
+                  <a:srgbClr val="091E42"/>
+                </a:solidFill>
+                <a:effectLst/>
+                <a:latin typeface="freight-text-pro"/>
+              </a:rPr>
+              <a:t>How many times in total across all games did the crew skip a vote? </a:t>
+            </a:r>
+          </a:p>
+        </p:txBody>
+      </p:sp>
+      <p:sp>
+        <p:nvSpPr>
+          <p:cNvPr id="3" name="Content Placeholder 2">
+            <a:extLst>
+              <a:ext uri="{FF2B5EF4-FFF2-40B4-BE49-F238E27FC236}">
+                <a16:creationId xmlns:a16="http://schemas.microsoft.com/office/drawing/2014/main" id="{4677FA30-90FF-75D7-7DB9-8E36155EF675}"/>
+              </a:ext>
+            </a:extLst>
+          </p:cNvPr>
+          <p:cNvSpPr>
+            <a:spLocks noGrp="1"/>
+          </p:cNvSpPr>
+          <p:nvPr>
+            <p:ph idx="1"/>
+          </p:nvPr>
+        </p:nvSpPr>
+        <p:spPr>
+          <a:xfrm>
+            <a:off x="673391" y="1518523"/>
+            <a:ext cx="10089107" cy="744703"/>
+          </a:xfrm>
+        </p:spPr>
+        <p:txBody>
+          <a:bodyPr>
+            <a:normAutofit fontScale="92500"/>
+          </a:bodyPr>
+          <a:lstStyle/>
+          <a:p>
+            <a:pPr marL="0" indent="0">
+              <a:buNone/>
+            </a:pPr>
+            <a:r>
+              <a:rPr lang="en-US" sz="1800" b="1" dirty="0"/>
+              <a:t>Command –</a:t>
+            </a:r>
+            <a:r>
+              <a:rPr lang="en-US" sz="1800" dirty="0"/>
+              <a:t>  </a:t>
+            </a:r>
+            <a:r>
+              <a:rPr lang="en-US" sz="1800" dirty="0" err="1"/>
+              <a:t>db.Game.aggregate</a:t>
+            </a:r>
+            <a:r>
+              <a:rPr lang="en-US" sz="1800" dirty="0"/>
+              <a:t>([{ $unwind: '$</a:t>
+            </a:r>
+            <a:r>
+              <a:rPr lang="en-US" sz="1800" dirty="0" err="1"/>
+              <a:t>Game_Feed</a:t>
+            </a:r>
+            <a:r>
+              <a:rPr lang="en-US" sz="1800" dirty="0"/>
+              <a:t>' },{$project: {'Game_Feed':1}},{$match:{'</a:t>
+            </a:r>
+            <a:r>
+              <a:rPr lang="en-US" sz="1800" dirty="0" err="1"/>
+              <a:t>Game_Feed.Game</a:t>
+            </a:r>
+            <a:r>
+              <a:rPr lang="en-US" sz="1800" dirty="0"/>
+              <a:t> </a:t>
+            </a:r>
+            <a:r>
+              <a:rPr lang="en-US" sz="1800" dirty="0" err="1"/>
+              <a:t>Feed':'Crew</a:t>
+            </a:r>
+            <a:r>
+              <a:rPr lang="en-US" sz="1800" dirty="0"/>
+              <a:t> skips voting.'}},{$group: {_</a:t>
+            </a:r>
+            <a:r>
+              <a:rPr lang="en-US" sz="1800" dirty="0" err="1"/>
+              <a:t>id:null,count</a:t>
+            </a:r>
+            <a:r>
+              <a:rPr lang="en-US" sz="1800" dirty="0"/>
+              <a:t>:{$sum:1}}}])</a:t>
+            </a:r>
+          </a:p>
+        </p:txBody>
+      </p:sp>
+      <p:sp>
+        <p:nvSpPr>
+          <p:cNvPr id="6" name="Content Placeholder 2">
+            <a:extLst>
+              <a:ext uri="{FF2B5EF4-FFF2-40B4-BE49-F238E27FC236}">
+                <a16:creationId xmlns:a16="http://schemas.microsoft.com/office/drawing/2014/main" id="{BDAA5264-D578-22F8-B106-D3E60E49D0DF}"/>
+              </a:ext>
+            </a:extLst>
+          </p:cNvPr>
+          <p:cNvSpPr txBox="1">
+            <a:spLocks/>
+          </p:cNvSpPr>
+          <p:nvPr/>
+        </p:nvSpPr>
+        <p:spPr>
+          <a:xfrm>
+            <a:off x="673391" y="2748450"/>
+            <a:ext cx="10089107" cy="1361099"/>
+          </a:xfrm>
+          <a:prstGeom prst="rect">
+            <a:avLst/>
+          </a:prstGeom>
+        </p:spPr>
+        <p:txBody>
+          <a:bodyPr vert="horz" lIns="91440" tIns="45720" rIns="91440" bIns="45720" rtlCol="0">
+            <a:normAutofit/>
+          </a:bodyPr>
+          <a:lstStyle>
+            <a:lvl1pPr marL="228600" indent="-228600" algn="l" defTabSz="914400" rtl="0" eaLnBrk="1" latinLnBrk="0" hangingPunct="1">
+              <a:lnSpc>
+                <a:spcPct val="90000"/>
+              </a:lnSpc>
+              <a:spcBef>
+                <a:spcPts val="1000"/>
+              </a:spcBef>
+              <a:buFont typeface="Arial" panose="020B0604020202020204" pitchFamily="34" charset="0"/>
+              <a:buChar char="•"/>
+              <a:defRPr sz="2800" kern="1200">
+                <a:solidFill>
+                  <a:schemeClr val="tx1"/>
+                </a:solidFill>
+                <a:latin typeface="+mn-lt"/>
+                <a:ea typeface="+mn-ea"/>
+                <a:cs typeface="+mn-cs"/>
+              </a:defRPr>
+            </a:lvl1pPr>
+            <a:lvl2pPr marL="685800" indent="-228600" algn="l" defTabSz="914400" rtl="0" eaLnBrk="1" latinLnBrk="0" hangingPunct="1">
+              <a:lnSpc>
+                <a:spcPct val="90000"/>
+              </a:lnSpc>
+              <a:spcBef>
+                <a:spcPts val="500"/>
+              </a:spcBef>
+              <a:buFont typeface="Arial" panose="020B0604020202020204" pitchFamily="34" charset="0"/>
+              <a:buChar char="•"/>
+              <a:defRPr sz="2400" kern="1200">
+                <a:solidFill>
+                  <a:schemeClr val="tx1"/>
+                </a:solidFill>
+                <a:latin typeface="+mn-lt"/>
+                <a:ea typeface="+mn-ea"/>
+                <a:cs typeface="+mn-cs"/>
+              </a:defRPr>
+            </a:lvl2pPr>
+            <a:lvl3pPr marL="1143000" indent="-228600" algn="l" defTabSz="914400" rtl="0" eaLnBrk="1" latinLnBrk="0" hangingPunct="1">
+              <a:lnSpc>
+                <a:spcPct val="90000"/>
+              </a:lnSpc>
+              <a:spcBef>
+                <a:spcPts val="500"/>
+              </a:spcBef>
+              <a:buFont typeface="Arial" panose="020B0604020202020204" pitchFamily="34" charset="0"/>
+              <a:buChar char="•"/>
+              <a:defRPr sz="2000" kern="1200">
+                <a:solidFill>
+                  <a:schemeClr val="tx1"/>
+                </a:solidFill>
+                <a:latin typeface="+mn-lt"/>
+                <a:ea typeface="+mn-ea"/>
+                <a:cs typeface="+mn-cs"/>
+              </a:defRPr>
+            </a:lvl3pPr>
+            <a:lvl4pPr marL="1600200" indent="-228600" algn="l" defTabSz="914400" rtl="0" eaLnBrk="1" latinLnBrk="0" hangingPunct="1">
+              <a:lnSpc>
+                <a:spcPct val="90000"/>
+              </a:lnSpc>
+              <a:spcBef>
+                <a:spcPts val="500"/>
+              </a:spcBef>
+              <a:buFont typeface="Arial" panose="020B0604020202020204" pitchFamily="34" charset="0"/>
+              <a:buChar char="•"/>
+              <a:defRPr sz="1800" kern="1200">
+                <a:solidFill>
+                  <a:schemeClr val="tx1"/>
+                </a:solidFill>
+                <a:latin typeface="+mn-lt"/>
+                <a:ea typeface="+mn-ea"/>
+                <a:cs typeface="+mn-cs"/>
+              </a:defRPr>
+            </a:lvl4pPr>
+            <a:lvl5pPr marL="2057400" indent="-228600" algn="l" defTabSz="914400" rtl="0" eaLnBrk="1" latinLnBrk="0" hangingPunct="1">
+              <a:lnSpc>
+                <a:spcPct val="90000"/>
+              </a:lnSpc>
+              <a:spcBef>
+                <a:spcPts val="500"/>
+              </a:spcBef>
+              <a:buFont typeface="Arial" panose="020B0604020202020204" pitchFamily="34" charset="0"/>
+              <a:buChar char="•"/>
+              <a:defRPr sz="1800" kern="1200">
+                <a:solidFill>
+                  <a:schemeClr val="tx1"/>
+                </a:solidFill>
+                <a:latin typeface="+mn-lt"/>
+                <a:ea typeface="+mn-ea"/>
+                <a:cs typeface="+mn-cs"/>
+              </a:defRPr>
+            </a:lvl5pPr>
+            <a:lvl6pPr marL="2514600" indent="-228600" algn="l" defTabSz="914400" rtl="0" eaLnBrk="1" latinLnBrk="0" hangingPunct="1">
+              <a:lnSpc>
+                <a:spcPct val="90000"/>
+              </a:lnSpc>
+              <a:spcBef>
+                <a:spcPts val="500"/>
+              </a:spcBef>
+              <a:buFont typeface="Arial" panose="020B0604020202020204" pitchFamily="34" charset="0"/>
+              <a:buChar char="•"/>
+              <a:defRPr sz="1800" kern="1200">
+                <a:solidFill>
+                  <a:schemeClr val="tx1"/>
+                </a:solidFill>
+                <a:latin typeface="+mn-lt"/>
+                <a:ea typeface="+mn-ea"/>
+                <a:cs typeface="+mn-cs"/>
+              </a:defRPr>
+            </a:lvl6pPr>
+            <a:lvl7pPr marL="2971800" indent="-228600" algn="l" defTabSz="914400" rtl="0" eaLnBrk="1" latinLnBrk="0" hangingPunct="1">
+              <a:lnSpc>
+                <a:spcPct val="90000"/>
+              </a:lnSpc>
+              <a:spcBef>
+                <a:spcPts val="500"/>
+              </a:spcBef>
+              <a:buFont typeface="Arial" panose="020B0604020202020204" pitchFamily="34" charset="0"/>
+              <a:buChar char="•"/>
+              <a:defRPr sz="1800" kern="1200">
+                <a:solidFill>
+                  <a:schemeClr val="tx1"/>
+                </a:solidFill>
+                <a:latin typeface="+mn-lt"/>
+                <a:ea typeface="+mn-ea"/>
+                <a:cs typeface="+mn-cs"/>
+              </a:defRPr>
+            </a:lvl7pPr>
+            <a:lvl8pPr marL="3429000" indent="-228600" algn="l" defTabSz="914400" rtl="0" eaLnBrk="1" latinLnBrk="0" hangingPunct="1">
+              <a:lnSpc>
+                <a:spcPct val="90000"/>
+              </a:lnSpc>
+              <a:spcBef>
+                <a:spcPts val="500"/>
+              </a:spcBef>
+              <a:buFont typeface="Arial" panose="020B0604020202020204" pitchFamily="34" charset="0"/>
+              <a:buChar char="•"/>
+              <a:defRPr sz="1800" kern="1200">
+                <a:solidFill>
+                  <a:schemeClr val="tx1"/>
+                </a:solidFill>
+                <a:latin typeface="+mn-lt"/>
+                <a:ea typeface="+mn-ea"/>
+                <a:cs typeface="+mn-cs"/>
+              </a:defRPr>
+            </a:lvl8pPr>
+            <a:lvl9pPr marL="3886200" indent="-228600" algn="l" defTabSz="914400" rtl="0" eaLnBrk="1" latinLnBrk="0" hangingPunct="1">
+              <a:lnSpc>
+                <a:spcPct val="90000"/>
+              </a:lnSpc>
+              <a:spcBef>
+                <a:spcPts val="500"/>
+              </a:spcBef>
+              <a:buFont typeface="Arial" panose="020B0604020202020204" pitchFamily="34" charset="0"/>
+              <a:buChar char="•"/>
+              <a:defRPr sz="1800" kern="1200">
+                <a:solidFill>
+                  <a:schemeClr val="tx1"/>
+                </a:solidFill>
+                <a:latin typeface="+mn-lt"/>
+                <a:ea typeface="+mn-ea"/>
+                <a:cs typeface="+mn-cs"/>
+              </a:defRPr>
+            </a:lvl9pPr>
+          </a:lstStyle>
+          <a:p>
+            <a:pPr marL="0" indent="0">
+              <a:buFont typeface="Arial" panose="020B0604020202020204" pitchFamily="34" charset="0"/>
+              <a:buNone/>
+            </a:pPr>
+            <a:r>
+              <a:rPr lang="en-US" sz="1800" b="1" dirty="0"/>
+              <a:t>Answer – </a:t>
+            </a:r>
+            <a:r>
+              <a:rPr lang="en-US" sz="1800" dirty="0"/>
+              <a:t>The crew skipped voting 692 times</a:t>
+            </a:r>
+          </a:p>
+        </p:txBody>
+      </p:sp>
+      <p:pic>
+        <p:nvPicPr>
+          <p:cNvPr id="7" name="Picture 6">
+            <a:extLst>
+              <a:ext uri="{FF2B5EF4-FFF2-40B4-BE49-F238E27FC236}">
+                <a16:creationId xmlns:a16="http://schemas.microsoft.com/office/drawing/2014/main" id="{8460EB58-19AB-F67C-31F4-BCF0F30C2E89}"/>
+              </a:ext>
+            </a:extLst>
+          </p:cNvPr>
+          <p:cNvPicPr>
+            <a:picLocks noChangeAspect="1"/>
+          </p:cNvPicPr>
+          <p:nvPr/>
+        </p:nvPicPr>
+        <p:blipFill>
+          <a:blip r:embed="rId2"/>
+          <a:stretch>
+            <a:fillRect/>
+          </a:stretch>
+        </p:blipFill>
+        <p:spPr>
+          <a:xfrm>
+            <a:off x="409432" y="4678660"/>
+            <a:ext cx="11532358" cy="655679"/>
+          </a:xfrm>
+          <a:prstGeom prst="rect">
+            <a:avLst/>
+          </a:prstGeom>
+        </p:spPr>
+      </p:pic>
+    </p:spTree>
+    <p:extLst>
+      <p:ext uri="{BB962C8B-B14F-4D97-AF65-F5344CB8AC3E}">
+        <p14:creationId xmlns:p14="http://schemas.microsoft.com/office/powerpoint/2010/main" val="2095008964"/>
+      </p:ext>
+    </p:extLst>
+  </p:cSld>
+  <p:clrMapOvr>
+    <a:masterClrMapping/>
+  </p:clrMapOvr>
+</p:sld>
+</file>
+
+<file path=ppt/slides/slide15.xml><?xml version="1.0" encoding="utf-8"?>
+<p:sld xmlns:a="http://schemas.openxmlformats.org/drawingml/2006/main" xmlns:r="http://schemas.openxmlformats.org/officeDocument/2006/relationships" xmlns:p="http://schemas.openxmlformats.org/presentationml/2006/main">
+  <p:cSld>
+    <p:spTree>
+      <p:nvGrpSpPr>
+        <p:cNvPr id="1" name=""/>
+        <p:cNvGrpSpPr/>
+        <p:nvPr/>
+      </p:nvGrpSpPr>
+      <p:grpSpPr>
+        <a:xfrm>
+          <a:off x="0" y="0"/>
+          <a:ext cx="0" cy="0"/>
+          <a:chOff x="0" y="0"/>
+          <a:chExt cx="0" cy="0"/>
+        </a:xfrm>
+      </p:grpSpPr>
+      <p:sp>
+        <p:nvSpPr>
+          <p:cNvPr id="4" name="TextBox 3">
+            <a:extLst>
+              <a:ext uri="{FF2B5EF4-FFF2-40B4-BE49-F238E27FC236}">
+                <a16:creationId xmlns:a16="http://schemas.microsoft.com/office/drawing/2014/main" id="{A48799DE-1563-519F-5751-7995A485ED47}"/>
+              </a:ext>
+            </a:extLst>
+          </p:cNvPr>
+          <p:cNvSpPr txBox="1"/>
+          <p:nvPr/>
+        </p:nvSpPr>
+        <p:spPr>
+          <a:xfrm>
+            <a:off x="637387" y="323529"/>
+            <a:ext cx="11304403" cy="369332"/>
+          </a:xfrm>
+          <a:prstGeom prst="rect">
+            <a:avLst/>
+          </a:prstGeom>
+          <a:noFill/>
+        </p:spPr>
+        <p:txBody>
+          <a:bodyPr wrap="square" rtlCol="0">
+            <a:spAutoFit/>
+          </a:bodyPr>
+          <a:lstStyle/>
+          <a:p>
+            <a:pPr algn="l" rtl="0"/>
+            <a:r>
+              <a:rPr lang="en-US" b="1" dirty="0"/>
+              <a:t>Question 3.4 - </a:t>
+            </a:r>
+            <a:r>
+              <a:rPr lang="en-US" b="1" i="0" dirty="0">
+                <a:solidFill>
+                  <a:srgbClr val="091E42"/>
+                </a:solidFill>
+                <a:effectLst/>
+                <a:latin typeface="freight-text-pro"/>
+              </a:rPr>
+              <a:t>Overall aggregation - </a:t>
+            </a:r>
+            <a:r>
+              <a:rPr lang="en-US" b="0" i="0" dirty="0">
+                <a:solidFill>
+                  <a:srgbClr val="091E42"/>
+                </a:solidFill>
+                <a:effectLst/>
+                <a:latin typeface="freight-text-pro"/>
+              </a:rPr>
+              <a:t>How many times in total across all matches does the crew vote against imposters?</a:t>
+            </a:r>
+          </a:p>
+        </p:txBody>
+      </p:sp>
+      <p:sp>
+        <p:nvSpPr>
+          <p:cNvPr id="3" name="Content Placeholder 2">
+            <a:extLst>
+              <a:ext uri="{FF2B5EF4-FFF2-40B4-BE49-F238E27FC236}">
+                <a16:creationId xmlns:a16="http://schemas.microsoft.com/office/drawing/2014/main" id="{4677FA30-90FF-75D7-7DB9-8E36155EF675}"/>
+              </a:ext>
+            </a:extLst>
+          </p:cNvPr>
+          <p:cNvSpPr>
+            <a:spLocks noGrp="1"/>
+          </p:cNvSpPr>
+          <p:nvPr>
+            <p:ph idx="1"/>
+          </p:nvPr>
+        </p:nvSpPr>
+        <p:spPr>
+          <a:xfrm>
+            <a:off x="673391" y="1518523"/>
+            <a:ext cx="10089107" cy="744703"/>
+          </a:xfrm>
+        </p:spPr>
+        <p:txBody>
+          <a:bodyPr>
+            <a:normAutofit fontScale="92500"/>
+          </a:bodyPr>
+          <a:lstStyle/>
+          <a:p>
+            <a:pPr marL="0" indent="0">
+              <a:buNone/>
+            </a:pPr>
+            <a:r>
+              <a:rPr lang="en-US" sz="1800" b="1" dirty="0"/>
+              <a:t>Command –</a:t>
+            </a:r>
+            <a:r>
+              <a:rPr lang="en-US" sz="1800" dirty="0"/>
+              <a:t>  </a:t>
+            </a:r>
+            <a:r>
+              <a:rPr lang="en-US" sz="1800" dirty="0" err="1"/>
+              <a:t>db.Game.aggregate</a:t>
+            </a:r>
+            <a:r>
+              <a:rPr lang="en-US" sz="1800" dirty="0"/>
+              <a:t>([{ $unwind: '$</a:t>
+            </a:r>
+            <a:r>
+              <a:rPr lang="en-US" sz="1800" dirty="0" err="1"/>
+              <a:t>Game_Feed</a:t>
+            </a:r>
+            <a:r>
+              <a:rPr lang="en-US" sz="1800" dirty="0"/>
+              <a:t>' },{$project: {'Game_Feed':1}},{$match:{'</a:t>
+            </a:r>
+            <a:r>
+              <a:rPr lang="en-US" sz="1800" dirty="0" err="1"/>
+              <a:t>Game_Feed.Game</a:t>
+            </a:r>
+            <a:r>
+              <a:rPr lang="en-US" sz="1800" dirty="0"/>
+              <a:t> </a:t>
+            </a:r>
+            <a:r>
+              <a:rPr lang="en-US" sz="1800" dirty="0" err="1"/>
+              <a:t>Feed':'Crew</a:t>
+            </a:r>
+            <a:r>
+              <a:rPr lang="en-US" sz="1800" dirty="0"/>
+              <a:t> skips voting.'}},{$group: {_</a:t>
+            </a:r>
+            <a:r>
+              <a:rPr lang="en-US" sz="1800" dirty="0" err="1"/>
+              <a:t>id:null,count</a:t>
+            </a:r>
+            <a:r>
+              <a:rPr lang="en-US" sz="1800" dirty="0"/>
+              <a:t>:{$sum:1}}}])</a:t>
+            </a:r>
+          </a:p>
+        </p:txBody>
+      </p:sp>
+      <p:sp>
+        <p:nvSpPr>
+          <p:cNvPr id="6" name="Content Placeholder 2">
+            <a:extLst>
+              <a:ext uri="{FF2B5EF4-FFF2-40B4-BE49-F238E27FC236}">
+                <a16:creationId xmlns:a16="http://schemas.microsoft.com/office/drawing/2014/main" id="{BDAA5264-D578-22F8-B106-D3E60E49D0DF}"/>
+              </a:ext>
+            </a:extLst>
+          </p:cNvPr>
+          <p:cNvSpPr txBox="1">
+            <a:spLocks/>
+          </p:cNvSpPr>
+          <p:nvPr/>
+        </p:nvSpPr>
+        <p:spPr>
+          <a:xfrm>
+            <a:off x="673391" y="2748450"/>
+            <a:ext cx="10089107" cy="1361099"/>
+          </a:xfrm>
+          <a:prstGeom prst="rect">
+            <a:avLst/>
+          </a:prstGeom>
+        </p:spPr>
+        <p:txBody>
+          <a:bodyPr vert="horz" lIns="91440" tIns="45720" rIns="91440" bIns="45720" rtlCol="0">
+            <a:normAutofit/>
+          </a:bodyPr>
+          <a:lstStyle>
+            <a:lvl1pPr marL="228600" indent="-228600" algn="l" defTabSz="914400" rtl="0" eaLnBrk="1" latinLnBrk="0" hangingPunct="1">
+              <a:lnSpc>
+                <a:spcPct val="90000"/>
+              </a:lnSpc>
+              <a:spcBef>
+                <a:spcPts val="1000"/>
+              </a:spcBef>
+              <a:buFont typeface="Arial" panose="020B0604020202020204" pitchFamily="34" charset="0"/>
+              <a:buChar char="•"/>
+              <a:defRPr sz="2800" kern="1200">
+                <a:solidFill>
+                  <a:schemeClr val="tx1"/>
+                </a:solidFill>
+                <a:latin typeface="+mn-lt"/>
+                <a:ea typeface="+mn-ea"/>
+                <a:cs typeface="+mn-cs"/>
+              </a:defRPr>
+            </a:lvl1pPr>
+            <a:lvl2pPr marL="685800" indent="-228600" algn="l" defTabSz="914400" rtl="0" eaLnBrk="1" latinLnBrk="0" hangingPunct="1">
+              <a:lnSpc>
+                <a:spcPct val="90000"/>
+              </a:lnSpc>
+              <a:spcBef>
+                <a:spcPts val="500"/>
+              </a:spcBef>
+              <a:buFont typeface="Arial" panose="020B0604020202020204" pitchFamily="34" charset="0"/>
+              <a:buChar char="•"/>
+              <a:defRPr sz="2400" kern="1200">
+                <a:solidFill>
+                  <a:schemeClr val="tx1"/>
+                </a:solidFill>
+                <a:latin typeface="+mn-lt"/>
+                <a:ea typeface="+mn-ea"/>
+                <a:cs typeface="+mn-cs"/>
+              </a:defRPr>
+            </a:lvl2pPr>
+            <a:lvl3pPr marL="1143000" indent="-228600" algn="l" defTabSz="914400" rtl="0" eaLnBrk="1" latinLnBrk="0" hangingPunct="1">
+              <a:lnSpc>
+                <a:spcPct val="90000"/>
+              </a:lnSpc>
+              <a:spcBef>
+                <a:spcPts val="500"/>
+              </a:spcBef>
+              <a:buFont typeface="Arial" panose="020B0604020202020204" pitchFamily="34" charset="0"/>
+              <a:buChar char="•"/>
+              <a:defRPr sz="2000" kern="1200">
+                <a:solidFill>
+                  <a:schemeClr val="tx1"/>
+                </a:solidFill>
+                <a:latin typeface="+mn-lt"/>
+                <a:ea typeface="+mn-ea"/>
+                <a:cs typeface="+mn-cs"/>
+              </a:defRPr>
+            </a:lvl3pPr>
+            <a:lvl4pPr marL="1600200" indent="-228600" algn="l" defTabSz="914400" rtl="0" eaLnBrk="1" latinLnBrk="0" hangingPunct="1">
+              <a:lnSpc>
+                <a:spcPct val="90000"/>
+              </a:lnSpc>
+              <a:spcBef>
+                <a:spcPts val="500"/>
+              </a:spcBef>
+              <a:buFont typeface="Arial" panose="020B0604020202020204" pitchFamily="34" charset="0"/>
+              <a:buChar char="•"/>
+              <a:defRPr sz="1800" kern="1200">
+                <a:solidFill>
+                  <a:schemeClr val="tx1"/>
+                </a:solidFill>
+                <a:latin typeface="+mn-lt"/>
+                <a:ea typeface="+mn-ea"/>
+                <a:cs typeface="+mn-cs"/>
+              </a:defRPr>
+            </a:lvl4pPr>
+            <a:lvl5pPr marL="2057400" indent="-228600" algn="l" defTabSz="914400" rtl="0" eaLnBrk="1" latinLnBrk="0" hangingPunct="1">
+              <a:lnSpc>
+                <a:spcPct val="90000"/>
+              </a:lnSpc>
+              <a:spcBef>
+                <a:spcPts val="500"/>
+              </a:spcBef>
+              <a:buFont typeface="Arial" panose="020B0604020202020204" pitchFamily="34" charset="0"/>
+              <a:buChar char="•"/>
+              <a:defRPr sz="1800" kern="1200">
+                <a:solidFill>
+                  <a:schemeClr val="tx1"/>
+                </a:solidFill>
+                <a:latin typeface="+mn-lt"/>
+                <a:ea typeface="+mn-ea"/>
+                <a:cs typeface="+mn-cs"/>
+              </a:defRPr>
+            </a:lvl5pPr>
+            <a:lvl6pPr marL="2514600" indent="-228600" algn="l" defTabSz="914400" rtl="0" eaLnBrk="1" latinLnBrk="0" hangingPunct="1">
+              <a:lnSpc>
+                <a:spcPct val="90000"/>
+              </a:lnSpc>
+              <a:spcBef>
+                <a:spcPts val="500"/>
+              </a:spcBef>
+              <a:buFont typeface="Arial" panose="020B0604020202020204" pitchFamily="34" charset="0"/>
+              <a:buChar char="•"/>
+              <a:defRPr sz="1800" kern="1200">
+                <a:solidFill>
+                  <a:schemeClr val="tx1"/>
+                </a:solidFill>
+                <a:latin typeface="+mn-lt"/>
+                <a:ea typeface="+mn-ea"/>
+                <a:cs typeface="+mn-cs"/>
+              </a:defRPr>
+            </a:lvl6pPr>
+            <a:lvl7pPr marL="2971800" indent="-228600" algn="l" defTabSz="914400" rtl="0" eaLnBrk="1" latinLnBrk="0" hangingPunct="1">
+              <a:lnSpc>
+                <a:spcPct val="90000"/>
+              </a:lnSpc>
+              <a:spcBef>
+                <a:spcPts val="500"/>
+              </a:spcBef>
+              <a:buFont typeface="Arial" panose="020B0604020202020204" pitchFamily="34" charset="0"/>
+              <a:buChar char="•"/>
+              <a:defRPr sz="1800" kern="1200">
+                <a:solidFill>
+                  <a:schemeClr val="tx1"/>
+                </a:solidFill>
+                <a:latin typeface="+mn-lt"/>
+                <a:ea typeface="+mn-ea"/>
+                <a:cs typeface="+mn-cs"/>
+              </a:defRPr>
+            </a:lvl7pPr>
+            <a:lvl8pPr marL="3429000" indent="-228600" algn="l" defTabSz="914400" rtl="0" eaLnBrk="1" latinLnBrk="0" hangingPunct="1">
+              <a:lnSpc>
+                <a:spcPct val="90000"/>
+              </a:lnSpc>
+              <a:spcBef>
+                <a:spcPts val="500"/>
+              </a:spcBef>
+              <a:buFont typeface="Arial" panose="020B0604020202020204" pitchFamily="34" charset="0"/>
+              <a:buChar char="•"/>
+              <a:defRPr sz="1800" kern="1200">
+                <a:solidFill>
+                  <a:schemeClr val="tx1"/>
+                </a:solidFill>
+                <a:latin typeface="+mn-lt"/>
+                <a:ea typeface="+mn-ea"/>
+                <a:cs typeface="+mn-cs"/>
+              </a:defRPr>
+            </a:lvl8pPr>
+            <a:lvl9pPr marL="3886200" indent="-228600" algn="l" defTabSz="914400" rtl="0" eaLnBrk="1" latinLnBrk="0" hangingPunct="1">
+              <a:lnSpc>
+                <a:spcPct val="90000"/>
+              </a:lnSpc>
+              <a:spcBef>
+                <a:spcPts val="500"/>
+              </a:spcBef>
+              <a:buFont typeface="Arial" panose="020B0604020202020204" pitchFamily="34" charset="0"/>
+              <a:buChar char="•"/>
+              <a:defRPr sz="1800" kern="1200">
+                <a:solidFill>
+                  <a:schemeClr val="tx1"/>
+                </a:solidFill>
+                <a:latin typeface="+mn-lt"/>
+                <a:ea typeface="+mn-ea"/>
+                <a:cs typeface="+mn-cs"/>
+              </a:defRPr>
+            </a:lvl9pPr>
+          </a:lstStyle>
+          <a:p>
+            <a:pPr marL="0" indent="0">
+              <a:buFont typeface="Arial" panose="020B0604020202020204" pitchFamily="34" charset="0"/>
+              <a:buNone/>
+            </a:pPr>
+            <a:r>
+              <a:rPr lang="en-US" sz="1800" b="1" dirty="0"/>
+              <a:t>Answer – </a:t>
+            </a:r>
+            <a:r>
+              <a:rPr lang="en-US" sz="1800" dirty="0"/>
+              <a:t>The crew skipped voting 692 times</a:t>
+            </a:r>
+          </a:p>
+        </p:txBody>
+      </p:sp>
+    </p:spTree>
+    <p:extLst>
+      <p:ext uri="{BB962C8B-B14F-4D97-AF65-F5344CB8AC3E}">
+        <p14:creationId xmlns:p14="http://schemas.microsoft.com/office/powerpoint/2010/main" val="2966564204"/>
       </p:ext>
     </p:extLst>
   </p:cSld>

</xml_diff>

<commit_message>
AmongUS assignment - added section 3 completed
</commit_message>
<xml_diff>
--- a/AmongUS Assignment.pptx
+++ b/AmongUS Assignment.pptx
@@ -20,6 +20,7 @@
     <p:sldId id="271" r:id="rId14"/>
     <p:sldId id="272" r:id="rId15"/>
     <p:sldId id="273" r:id="rId16"/>
+    <p:sldId id="274" r:id="rId17"/>
   </p:sldIdLst>
   <p:sldSz cx="12192000" cy="6858000"/>
   <p:notesSz cx="6858000" cy="9144000"/>
@@ -5489,7 +5490,7 @@
             <a:pPr algn="l" rtl="0"/>
             <a:r>
               <a:rPr lang="en-US" b="1" dirty="0"/>
-              <a:t>Question 3.4 - </a:t>
+              <a:t>Question 3.5 - </a:t>
             </a:r>
             <a:r>
               <a:rPr lang="en-US" b="1" i="0" dirty="0">
@@ -5538,7 +5539,7 @@
         </p:spPr>
         <p:txBody>
           <a:bodyPr>
-            <a:normAutofit fontScale="92500"/>
+            <a:normAutofit fontScale="92500" lnSpcReduction="10000"/>
           </a:bodyPr>
           <a:lstStyle/>
           <a:p>
@@ -5551,7 +5552,7 @@
             </a:r>
             <a:r>
               <a:rPr lang="en-US" sz="1800" dirty="0"/>
-              <a:t>  </a:t>
+              <a:t> AMONGUS&gt;</a:t>
             </a:r>
             <a:r>
               <a:rPr lang="en-US" sz="1800" dirty="0" err="1"/>
@@ -5571,27 +5572,27 @@
             </a:r>
             <a:r>
               <a:rPr lang="en-US" sz="1800" dirty="0" err="1"/>
-              <a:t>Game_Feed.Game</a:t>
+              <a:t>Game_Feed.Outcome</a:t>
             </a:r>
             <a:r>
               <a:rPr lang="en-US" sz="1800" dirty="0"/>
-              <a:t> </a:t>
+              <a:t>':{ $regex: "End$"}}},{ $group: { _id: { Action: "$</a:t>
             </a:r>
             <a:r>
               <a:rPr lang="en-US" sz="1800" dirty="0" err="1"/>
-              <a:t>Feed':'Crew</a:t>
+              <a:t>Game_Feed.Action</a:t>
             </a:r>
             <a:r>
               <a:rPr lang="en-US" sz="1800" dirty="0"/>
-              <a:t> skips voting.'}},{$group: {_</a:t>
+              <a:t>" }, </a:t>
             </a:r>
             <a:r>
               <a:rPr lang="en-US" sz="1800" dirty="0" err="1"/>
-              <a:t>id:null,count</a:t>
+              <a:t>totalwins</a:t>
             </a:r>
             <a:r>
               <a:rPr lang="en-US" sz="1800" dirty="0"/>
-              <a:t>:{$sum:1}}}])</a:t>
+              <a:t>: { $sum:1} } }])</a:t>
             </a:r>
           </a:p>
         </p:txBody>
@@ -5612,8 +5613,8 @@
         </p:nvSpPr>
         <p:spPr>
           <a:xfrm>
-            <a:off x="673391" y="2748450"/>
-            <a:ext cx="10089107" cy="1361099"/>
+            <a:off x="673391" y="2748451"/>
+            <a:ext cx="10089107" cy="845460"/>
           </a:xfrm>
           <a:prstGeom prst="rect">
             <a:avLst/>
@@ -5798,15 +5799,450 @@
             </a:r>
             <a:r>
               <a:rPr lang="en-US" sz="1800" dirty="0"/>
-              <a:t>The crew skipped voting 692 times</a:t>
-            </a:r>
-          </a:p>
-        </p:txBody>
-      </p:sp>
+              <a:t>The crew wins  voting 279 times</a:t>
+            </a:r>
+          </a:p>
+        </p:txBody>
+      </p:sp>
+      <p:pic>
+        <p:nvPicPr>
+          <p:cNvPr id="5" name="Picture 4">
+            <a:extLst>
+              <a:ext uri="{FF2B5EF4-FFF2-40B4-BE49-F238E27FC236}">
+                <a16:creationId xmlns:a16="http://schemas.microsoft.com/office/drawing/2014/main" id="{C213270E-79D1-937E-DA42-F6A327599F23}"/>
+              </a:ext>
+            </a:extLst>
+          </p:cNvPr>
+          <p:cNvPicPr>
+            <a:picLocks noChangeAspect="1"/>
+          </p:cNvPicPr>
+          <p:nvPr/>
+        </p:nvPicPr>
+        <p:blipFill>
+          <a:blip r:embed="rId2"/>
+          <a:stretch>
+            <a:fillRect/>
+          </a:stretch>
+        </p:blipFill>
+        <p:spPr>
+          <a:xfrm>
+            <a:off x="445261" y="3939680"/>
+            <a:ext cx="11496529" cy="1227494"/>
+          </a:xfrm>
+          <a:prstGeom prst="rect">
+            <a:avLst/>
+          </a:prstGeom>
+        </p:spPr>
+      </p:pic>
     </p:spTree>
     <p:extLst>
       <p:ext uri="{BB962C8B-B14F-4D97-AF65-F5344CB8AC3E}">
         <p14:creationId xmlns:p14="http://schemas.microsoft.com/office/powerpoint/2010/main" val="2966564204"/>
+      </p:ext>
+    </p:extLst>
+  </p:cSld>
+  <p:clrMapOvr>
+    <a:masterClrMapping/>
+  </p:clrMapOvr>
+</p:sld>
+</file>
+
+<file path=ppt/slides/slide16.xml><?xml version="1.0" encoding="utf-8"?>
+<p:sld xmlns:a="http://schemas.openxmlformats.org/drawingml/2006/main" xmlns:r="http://schemas.openxmlformats.org/officeDocument/2006/relationships" xmlns:p="http://schemas.openxmlformats.org/presentationml/2006/main">
+  <p:cSld>
+    <p:spTree>
+      <p:nvGrpSpPr>
+        <p:cNvPr id="1" name=""/>
+        <p:cNvGrpSpPr/>
+        <p:nvPr/>
+      </p:nvGrpSpPr>
+      <p:grpSpPr>
+        <a:xfrm>
+          <a:off x="0" y="0"/>
+          <a:ext cx="0" cy="0"/>
+          <a:chOff x="0" y="0"/>
+          <a:chExt cx="0" cy="0"/>
+        </a:xfrm>
+      </p:grpSpPr>
+      <p:sp>
+        <p:nvSpPr>
+          <p:cNvPr id="4" name="TextBox 3">
+            <a:extLst>
+              <a:ext uri="{FF2B5EF4-FFF2-40B4-BE49-F238E27FC236}">
+                <a16:creationId xmlns:a16="http://schemas.microsoft.com/office/drawing/2014/main" id="{A48799DE-1563-519F-5751-7995A485ED47}"/>
+              </a:ext>
+            </a:extLst>
+          </p:cNvPr>
+          <p:cNvSpPr txBox="1"/>
+          <p:nvPr/>
+        </p:nvSpPr>
+        <p:spPr>
+          <a:xfrm>
+            <a:off x="637387" y="323529"/>
+            <a:ext cx="11304403" cy="923330"/>
+          </a:xfrm>
+          <a:prstGeom prst="rect">
+            <a:avLst/>
+          </a:prstGeom>
+          <a:noFill/>
+        </p:spPr>
+        <p:txBody>
+          <a:bodyPr wrap="square" rtlCol="0">
+            <a:spAutoFit/>
+          </a:bodyPr>
+          <a:lstStyle/>
+          <a:p>
+            <a:pPr algn="l" rtl="0"/>
+            <a:r>
+              <a:rPr lang="en-US" b="1" dirty="0"/>
+              <a:t>Question 3.6 - </a:t>
+            </a:r>
+            <a:r>
+              <a:rPr lang="en-US" b="1" i="0" dirty="0">
+                <a:solidFill>
+                  <a:srgbClr val="091E42"/>
+                </a:solidFill>
+                <a:effectLst/>
+                <a:latin typeface="freight-text-pro"/>
+              </a:rPr>
+              <a:t>Overall aggregation - </a:t>
+            </a:r>
+            <a:r>
+              <a:rPr lang="en-US" b="0" i="0" dirty="0">
+                <a:solidFill>
+                  <a:srgbClr val="091E42"/>
+                </a:solidFill>
+                <a:effectLst/>
+                <a:latin typeface="freight-text-pro"/>
+              </a:rPr>
+              <a:t>The questions you answered in this task were all related to high-level aggregations across the entire collection. In your opinion, is the game more or less hard for impostors? Justify your answer with suitable insights from the data.</a:t>
+            </a:r>
+          </a:p>
+        </p:txBody>
+      </p:sp>
+      <p:sp>
+        <p:nvSpPr>
+          <p:cNvPr id="3" name="Content Placeholder 2">
+            <a:extLst>
+              <a:ext uri="{FF2B5EF4-FFF2-40B4-BE49-F238E27FC236}">
+                <a16:creationId xmlns:a16="http://schemas.microsoft.com/office/drawing/2014/main" id="{4677FA30-90FF-75D7-7DB9-8E36155EF675}"/>
+              </a:ext>
+            </a:extLst>
+          </p:cNvPr>
+          <p:cNvSpPr>
+            <a:spLocks noGrp="1"/>
+          </p:cNvSpPr>
+          <p:nvPr>
+            <p:ph idx="1"/>
+          </p:nvPr>
+        </p:nvSpPr>
+        <p:spPr>
+          <a:xfrm>
+            <a:off x="673391" y="1518523"/>
+            <a:ext cx="10089107" cy="744703"/>
+          </a:xfrm>
+        </p:spPr>
+        <p:txBody>
+          <a:bodyPr>
+            <a:normAutofit fontScale="92500" lnSpcReduction="10000"/>
+          </a:bodyPr>
+          <a:lstStyle/>
+          <a:p>
+            <a:pPr marL="0" indent="0">
+              <a:buNone/>
+            </a:pPr>
+            <a:r>
+              <a:rPr lang="en-US" sz="1800" b="1" dirty="0"/>
+              <a:t>Command –</a:t>
+            </a:r>
+            <a:r>
+              <a:rPr lang="en-US" sz="1800" dirty="0"/>
+              <a:t> AMONGUS&gt;</a:t>
+            </a:r>
+            <a:r>
+              <a:rPr lang="en-US" sz="1800" dirty="0" err="1"/>
+              <a:t>db.Game.aggregate</a:t>
+            </a:r>
+            <a:r>
+              <a:rPr lang="en-US" sz="1800" dirty="0"/>
+              <a:t>([{ $unwind: '$</a:t>
+            </a:r>
+            <a:r>
+              <a:rPr lang="en-US" sz="1800" dirty="0" err="1"/>
+              <a:t>Game_Feed</a:t>
+            </a:r>
+            <a:r>
+              <a:rPr lang="en-US" sz="1800" dirty="0"/>
+              <a:t>' },{$project: {'Game_Feed':1}},{$match:{'</a:t>
+            </a:r>
+            <a:r>
+              <a:rPr lang="en-US" sz="1800" dirty="0" err="1"/>
+              <a:t>Game_Feed.Outcome</a:t>
+            </a:r>
+            <a:r>
+              <a:rPr lang="en-US" sz="1800" dirty="0"/>
+              <a:t>':{ $regex: "End$"}}},{ $group: { _id: { Action: "$</a:t>
+            </a:r>
+            <a:r>
+              <a:rPr lang="en-US" sz="1800" dirty="0" err="1"/>
+              <a:t>Game_Feed.Action</a:t>
+            </a:r>
+            <a:r>
+              <a:rPr lang="en-US" sz="1800" dirty="0"/>
+              <a:t>" }, </a:t>
+            </a:r>
+            <a:r>
+              <a:rPr lang="en-US" sz="1800" dirty="0" err="1"/>
+              <a:t>totalwins</a:t>
+            </a:r>
+            <a:r>
+              <a:rPr lang="en-US" sz="1800" dirty="0"/>
+              <a:t>: { $sum:1} } }])</a:t>
+            </a:r>
+          </a:p>
+        </p:txBody>
+      </p:sp>
+      <p:sp>
+        <p:nvSpPr>
+          <p:cNvPr id="6" name="Content Placeholder 2">
+            <a:extLst>
+              <a:ext uri="{FF2B5EF4-FFF2-40B4-BE49-F238E27FC236}">
+                <a16:creationId xmlns:a16="http://schemas.microsoft.com/office/drawing/2014/main" id="{BDAA5264-D578-22F8-B106-D3E60E49D0DF}"/>
+              </a:ext>
+            </a:extLst>
+          </p:cNvPr>
+          <p:cNvSpPr txBox="1">
+            <a:spLocks/>
+          </p:cNvSpPr>
+          <p:nvPr/>
+        </p:nvSpPr>
+        <p:spPr>
+          <a:xfrm>
+            <a:off x="673391" y="2748451"/>
+            <a:ext cx="10089107" cy="845460"/>
+          </a:xfrm>
+          <a:prstGeom prst="rect">
+            <a:avLst/>
+          </a:prstGeom>
+        </p:spPr>
+        <p:txBody>
+          <a:bodyPr vert="horz" lIns="91440" tIns="45720" rIns="91440" bIns="45720" rtlCol="0">
+            <a:normAutofit/>
+          </a:bodyPr>
+          <a:lstStyle>
+            <a:lvl1pPr marL="228600" indent="-228600" algn="l" defTabSz="914400" rtl="0" eaLnBrk="1" latinLnBrk="0" hangingPunct="1">
+              <a:lnSpc>
+                <a:spcPct val="90000"/>
+              </a:lnSpc>
+              <a:spcBef>
+                <a:spcPts val="1000"/>
+              </a:spcBef>
+              <a:buFont typeface="Arial" panose="020B0604020202020204" pitchFamily="34" charset="0"/>
+              <a:buChar char="•"/>
+              <a:defRPr sz="2800" kern="1200">
+                <a:solidFill>
+                  <a:schemeClr val="tx1"/>
+                </a:solidFill>
+                <a:latin typeface="+mn-lt"/>
+                <a:ea typeface="+mn-ea"/>
+                <a:cs typeface="+mn-cs"/>
+              </a:defRPr>
+            </a:lvl1pPr>
+            <a:lvl2pPr marL="685800" indent="-228600" algn="l" defTabSz="914400" rtl="0" eaLnBrk="1" latinLnBrk="0" hangingPunct="1">
+              <a:lnSpc>
+                <a:spcPct val="90000"/>
+              </a:lnSpc>
+              <a:spcBef>
+                <a:spcPts val="500"/>
+              </a:spcBef>
+              <a:buFont typeface="Arial" panose="020B0604020202020204" pitchFamily="34" charset="0"/>
+              <a:buChar char="•"/>
+              <a:defRPr sz="2400" kern="1200">
+                <a:solidFill>
+                  <a:schemeClr val="tx1"/>
+                </a:solidFill>
+                <a:latin typeface="+mn-lt"/>
+                <a:ea typeface="+mn-ea"/>
+                <a:cs typeface="+mn-cs"/>
+              </a:defRPr>
+            </a:lvl2pPr>
+            <a:lvl3pPr marL="1143000" indent="-228600" algn="l" defTabSz="914400" rtl="0" eaLnBrk="1" latinLnBrk="0" hangingPunct="1">
+              <a:lnSpc>
+                <a:spcPct val="90000"/>
+              </a:lnSpc>
+              <a:spcBef>
+                <a:spcPts val="500"/>
+              </a:spcBef>
+              <a:buFont typeface="Arial" panose="020B0604020202020204" pitchFamily="34" charset="0"/>
+              <a:buChar char="•"/>
+              <a:defRPr sz="2000" kern="1200">
+                <a:solidFill>
+                  <a:schemeClr val="tx1"/>
+                </a:solidFill>
+                <a:latin typeface="+mn-lt"/>
+                <a:ea typeface="+mn-ea"/>
+                <a:cs typeface="+mn-cs"/>
+              </a:defRPr>
+            </a:lvl3pPr>
+            <a:lvl4pPr marL="1600200" indent="-228600" algn="l" defTabSz="914400" rtl="0" eaLnBrk="1" latinLnBrk="0" hangingPunct="1">
+              <a:lnSpc>
+                <a:spcPct val="90000"/>
+              </a:lnSpc>
+              <a:spcBef>
+                <a:spcPts val="500"/>
+              </a:spcBef>
+              <a:buFont typeface="Arial" panose="020B0604020202020204" pitchFamily="34" charset="0"/>
+              <a:buChar char="•"/>
+              <a:defRPr sz="1800" kern="1200">
+                <a:solidFill>
+                  <a:schemeClr val="tx1"/>
+                </a:solidFill>
+                <a:latin typeface="+mn-lt"/>
+                <a:ea typeface="+mn-ea"/>
+                <a:cs typeface="+mn-cs"/>
+              </a:defRPr>
+            </a:lvl4pPr>
+            <a:lvl5pPr marL="2057400" indent="-228600" algn="l" defTabSz="914400" rtl="0" eaLnBrk="1" latinLnBrk="0" hangingPunct="1">
+              <a:lnSpc>
+                <a:spcPct val="90000"/>
+              </a:lnSpc>
+              <a:spcBef>
+                <a:spcPts val="500"/>
+              </a:spcBef>
+              <a:buFont typeface="Arial" panose="020B0604020202020204" pitchFamily="34" charset="0"/>
+              <a:buChar char="•"/>
+              <a:defRPr sz="1800" kern="1200">
+                <a:solidFill>
+                  <a:schemeClr val="tx1"/>
+                </a:solidFill>
+                <a:latin typeface="+mn-lt"/>
+                <a:ea typeface="+mn-ea"/>
+                <a:cs typeface="+mn-cs"/>
+              </a:defRPr>
+            </a:lvl5pPr>
+            <a:lvl6pPr marL="2514600" indent="-228600" algn="l" defTabSz="914400" rtl="0" eaLnBrk="1" latinLnBrk="0" hangingPunct="1">
+              <a:lnSpc>
+                <a:spcPct val="90000"/>
+              </a:lnSpc>
+              <a:spcBef>
+                <a:spcPts val="500"/>
+              </a:spcBef>
+              <a:buFont typeface="Arial" panose="020B0604020202020204" pitchFamily="34" charset="0"/>
+              <a:buChar char="•"/>
+              <a:defRPr sz="1800" kern="1200">
+                <a:solidFill>
+                  <a:schemeClr val="tx1"/>
+                </a:solidFill>
+                <a:latin typeface="+mn-lt"/>
+                <a:ea typeface="+mn-ea"/>
+                <a:cs typeface="+mn-cs"/>
+              </a:defRPr>
+            </a:lvl6pPr>
+            <a:lvl7pPr marL="2971800" indent="-228600" algn="l" defTabSz="914400" rtl="0" eaLnBrk="1" latinLnBrk="0" hangingPunct="1">
+              <a:lnSpc>
+                <a:spcPct val="90000"/>
+              </a:lnSpc>
+              <a:spcBef>
+                <a:spcPts val="500"/>
+              </a:spcBef>
+              <a:buFont typeface="Arial" panose="020B0604020202020204" pitchFamily="34" charset="0"/>
+              <a:buChar char="•"/>
+              <a:defRPr sz="1800" kern="1200">
+                <a:solidFill>
+                  <a:schemeClr val="tx1"/>
+                </a:solidFill>
+                <a:latin typeface="+mn-lt"/>
+                <a:ea typeface="+mn-ea"/>
+                <a:cs typeface="+mn-cs"/>
+              </a:defRPr>
+            </a:lvl7pPr>
+            <a:lvl8pPr marL="3429000" indent="-228600" algn="l" defTabSz="914400" rtl="0" eaLnBrk="1" latinLnBrk="0" hangingPunct="1">
+              <a:lnSpc>
+                <a:spcPct val="90000"/>
+              </a:lnSpc>
+              <a:spcBef>
+                <a:spcPts val="500"/>
+              </a:spcBef>
+              <a:buFont typeface="Arial" panose="020B0604020202020204" pitchFamily="34" charset="0"/>
+              <a:buChar char="•"/>
+              <a:defRPr sz="1800" kern="1200">
+                <a:solidFill>
+                  <a:schemeClr val="tx1"/>
+                </a:solidFill>
+                <a:latin typeface="+mn-lt"/>
+                <a:ea typeface="+mn-ea"/>
+                <a:cs typeface="+mn-cs"/>
+              </a:defRPr>
+            </a:lvl8pPr>
+            <a:lvl9pPr marL="3886200" indent="-228600" algn="l" defTabSz="914400" rtl="0" eaLnBrk="1" latinLnBrk="0" hangingPunct="1">
+              <a:lnSpc>
+                <a:spcPct val="90000"/>
+              </a:lnSpc>
+              <a:spcBef>
+                <a:spcPts val="500"/>
+              </a:spcBef>
+              <a:buFont typeface="Arial" panose="020B0604020202020204" pitchFamily="34" charset="0"/>
+              <a:buChar char="•"/>
+              <a:defRPr sz="1800" kern="1200">
+                <a:solidFill>
+                  <a:schemeClr val="tx1"/>
+                </a:solidFill>
+                <a:latin typeface="+mn-lt"/>
+                <a:ea typeface="+mn-ea"/>
+                <a:cs typeface="+mn-cs"/>
+              </a:defRPr>
+            </a:lvl9pPr>
+          </a:lstStyle>
+          <a:p>
+            <a:pPr marL="0" indent="0">
+              <a:buFont typeface="Arial" panose="020B0604020202020204" pitchFamily="34" charset="0"/>
+              <a:buNone/>
+            </a:pPr>
+            <a:r>
+              <a:rPr lang="en-US" sz="1800" b="1" dirty="0"/>
+              <a:t>Answer – </a:t>
+            </a:r>
+            <a:r>
+              <a:rPr lang="en-US" sz="1800" dirty="0"/>
+              <a:t>Imposter won 35.27% (176 out of 499) of the time and Crew won 64.7% (323 out of 499). Since the odds of winning by Crew is ~65%, the game is hard for imposters. </a:t>
+            </a:r>
+          </a:p>
+        </p:txBody>
+      </p:sp>
+      <p:pic>
+        <p:nvPicPr>
+          <p:cNvPr id="5" name="Picture 4">
+            <a:extLst>
+              <a:ext uri="{FF2B5EF4-FFF2-40B4-BE49-F238E27FC236}">
+                <a16:creationId xmlns:a16="http://schemas.microsoft.com/office/drawing/2014/main" id="{C213270E-79D1-937E-DA42-F6A327599F23}"/>
+              </a:ext>
+            </a:extLst>
+          </p:cNvPr>
+          <p:cNvPicPr>
+            <a:picLocks noChangeAspect="1"/>
+          </p:cNvPicPr>
+          <p:nvPr/>
+        </p:nvPicPr>
+        <p:blipFill>
+          <a:blip r:embed="rId2"/>
+          <a:stretch>
+            <a:fillRect/>
+          </a:stretch>
+        </p:blipFill>
+        <p:spPr>
+          <a:xfrm>
+            <a:off x="445261" y="3939680"/>
+            <a:ext cx="11496529" cy="1227494"/>
+          </a:xfrm>
+          <a:prstGeom prst="rect">
+            <a:avLst/>
+          </a:prstGeom>
+        </p:spPr>
+      </p:pic>
+    </p:spTree>
+    <p:extLst>
+      <p:ext uri="{BB962C8B-B14F-4D97-AF65-F5344CB8AC3E}">
+        <p14:creationId xmlns:p14="http://schemas.microsoft.com/office/powerpoint/2010/main" val="2941205150"/>
       </p:ext>
     </p:extLst>
   </p:cSld>

</xml_diff>

<commit_message>
AmongUS assignment - added section 4 in progress
</commit_message>
<xml_diff>
--- a/AmongUS Assignment.pptx
+++ b/AmongUS Assignment.pptx
@@ -21,6 +21,10 @@
     <p:sldId id="272" r:id="rId15"/>
     <p:sldId id="273" r:id="rId16"/>
     <p:sldId id="274" r:id="rId17"/>
+    <p:sldId id="275" r:id="rId18"/>
+    <p:sldId id="276" r:id="rId19"/>
+    <p:sldId id="277" r:id="rId20"/>
+    <p:sldId id="279" r:id="rId21"/>
   </p:sldIdLst>
   <p:sldSz cx="12192000" cy="6858000"/>
   <p:notesSz cx="6858000" cy="9144000"/>
@@ -3665,7 +3669,7 @@
         <p:spPr>
           <a:xfrm>
             <a:off x="637387" y="323529"/>
-            <a:ext cx="11304403" cy="1200329"/>
+            <a:ext cx="11304403" cy="1477328"/>
           </a:xfrm>
           <a:prstGeom prst="rect">
             <a:avLst/>
@@ -3707,7 +3711,7 @@
                 <a:effectLst/>
                 <a:latin typeface="freight-text-pro"/>
               </a:rPr>
-              <a:t>If you were to redesign this database to make it easier to query what changes would you make to the structure? Explain your design decisions. Do not modify the structure, simply explain the changes you want to make and justify them.</a:t>
+              <a:t>If you were to redesign this database to make it easier to query, what changes would you make to the structure? Explain your design decisions. Do not modify the structure, simply explain the changes you want to make and justify them.</a:t>
             </a:r>
             <a:endParaRPr lang="en-US" dirty="0"/>
           </a:p>
@@ -6252,6 +6256,1108 @@
 </p:sld>
 </file>
 
+<file path=ppt/slides/slide17.xml><?xml version="1.0" encoding="utf-8"?>
+<p:sld xmlns:a="http://schemas.openxmlformats.org/drawingml/2006/main" xmlns:r="http://schemas.openxmlformats.org/officeDocument/2006/relationships" xmlns:p="http://schemas.openxmlformats.org/presentationml/2006/main">
+  <p:cSld>
+    <p:spTree>
+      <p:nvGrpSpPr>
+        <p:cNvPr id="1" name=""/>
+        <p:cNvGrpSpPr/>
+        <p:nvPr/>
+      </p:nvGrpSpPr>
+      <p:grpSpPr>
+        <a:xfrm>
+          <a:off x="0" y="0"/>
+          <a:ext cx="0" cy="0"/>
+          <a:chOff x="0" y="0"/>
+          <a:chExt cx="0" cy="0"/>
+        </a:xfrm>
+      </p:grpSpPr>
+      <p:sp>
+        <p:nvSpPr>
+          <p:cNvPr id="4" name="TextBox 3">
+            <a:extLst>
+              <a:ext uri="{FF2B5EF4-FFF2-40B4-BE49-F238E27FC236}">
+                <a16:creationId xmlns:a16="http://schemas.microsoft.com/office/drawing/2014/main" id="{A48799DE-1563-519F-5751-7995A485ED47}"/>
+              </a:ext>
+            </a:extLst>
+          </p:cNvPr>
+          <p:cNvSpPr txBox="1"/>
+          <p:nvPr/>
+        </p:nvSpPr>
+        <p:spPr>
+          <a:xfrm>
+            <a:off x="637387" y="323529"/>
+            <a:ext cx="11304403" cy="369332"/>
+          </a:xfrm>
+          <a:prstGeom prst="rect">
+            <a:avLst/>
+          </a:prstGeom>
+          <a:noFill/>
+        </p:spPr>
+        <p:txBody>
+          <a:bodyPr wrap="square" rtlCol="0">
+            <a:spAutoFit/>
+          </a:bodyPr>
+          <a:lstStyle/>
+          <a:p>
+            <a:pPr algn="l" rtl="0"/>
+            <a:r>
+              <a:rPr lang="en-US" b="1" dirty="0"/>
+              <a:t>Question 4.1 - </a:t>
+            </a:r>
+            <a:r>
+              <a:rPr lang="en-US" b="1" i="0" dirty="0">
+                <a:solidFill>
+                  <a:srgbClr val="091E42"/>
+                </a:solidFill>
+                <a:effectLst/>
+                <a:latin typeface="freight-text-pro"/>
+              </a:rPr>
+              <a:t>Player-level aggregation - </a:t>
+            </a:r>
+            <a:r>
+              <a:rPr lang="en-US" b="0" i="0" dirty="0">
+                <a:solidFill>
+                  <a:srgbClr val="091E42"/>
+                </a:solidFill>
+                <a:effectLst/>
+                <a:latin typeface="freight-text-pro"/>
+              </a:rPr>
+              <a:t>Find the number of unique players in the data set.</a:t>
+            </a:r>
+          </a:p>
+        </p:txBody>
+      </p:sp>
+      <p:sp>
+        <p:nvSpPr>
+          <p:cNvPr id="3" name="Content Placeholder 2">
+            <a:extLst>
+              <a:ext uri="{FF2B5EF4-FFF2-40B4-BE49-F238E27FC236}">
+                <a16:creationId xmlns:a16="http://schemas.microsoft.com/office/drawing/2014/main" id="{4677FA30-90FF-75D7-7DB9-8E36155EF675}"/>
+              </a:ext>
+            </a:extLst>
+          </p:cNvPr>
+          <p:cNvSpPr>
+            <a:spLocks noGrp="1"/>
+          </p:cNvSpPr>
+          <p:nvPr>
+            <p:ph idx="1"/>
+          </p:nvPr>
+        </p:nvSpPr>
+        <p:spPr>
+          <a:xfrm>
+            <a:off x="673391" y="1518523"/>
+            <a:ext cx="4943679" cy="1051805"/>
+          </a:xfrm>
+        </p:spPr>
+        <p:txBody>
+          <a:bodyPr>
+            <a:normAutofit fontScale="70000" lnSpcReduction="20000"/>
+          </a:bodyPr>
+          <a:lstStyle/>
+          <a:p>
+            <a:pPr marL="0" indent="0">
+              <a:buNone/>
+            </a:pPr>
+            <a:r>
+              <a:rPr lang="en-US" sz="1800" b="1" dirty="0"/>
+              <a:t>Command –</a:t>
+            </a:r>
+            <a:r>
+              <a:rPr lang="en-US" sz="1800" dirty="0"/>
+              <a:t> </a:t>
+            </a:r>
+            <a:r>
+              <a:rPr lang="en-US" sz="1800" dirty="0" err="1"/>
+              <a:t>db.Game.distinct</a:t>
+            </a:r>
+            <a:r>
+              <a:rPr lang="en-US" sz="1800" dirty="0"/>
+              <a:t>('player_data.name’)</a:t>
+            </a:r>
+          </a:p>
+          <a:p>
+            <a:pPr marL="0" indent="0">
+              <a:buNone/>
+            </a:pPr>
+            <a:r>
+              <a:rPr lang="en-US" sz="1800" dirty="0"/>
+              <a:t>AMONGUS&gt; </a:t>
+            </a:r>
+            <a:r>
+              <a:rPr lang="en-US" sz="1800" dirty="0" err="1"/>
+              <a:t>db.Game.distinct</a:t>
+            </a:r>
+            <a:r>
+              <a:rPr lang="en-US" sz="1800" dirty="0"/>
+              <a:t>('player_data.name').length</a:t>
+            </a:r>
+          </a:p>
+          <a:p>
+            <a:pPr marL="0" indent="0">
+              <a:buNone/>
+            </a:pPr>
+            <a:r>
+              <a:rPr lang="en-US" sz="1800" dirty="0"/>
+              <a:t>108   },</a:t>
+            </a:r>
+          </a:p>
+          <a:p>
+            <a:pPr marL="0" indent="0">
+              <a:buNone/>
+            </a:pPr>
+            <a:r>
+              <a:rPr lang="en-US" sz="1800" dirty="0"/>
+              <a:t>AMONGUS&gt;</a:t>
+            </a:r>
+          </a:p>
+        </p:txBody>
+      </p:sp>
+      <p:sp>
+        <p:nvSpPr>
+          <p:cNvPr id="6" name="Content Placeholder 2">
+            <a:extLst>
+              <a:ext uri="{FF2B5EF4-FFF2-40B4-BE49-F238E27FC236}">
+                <a16:creationId xmlns:a16="http://schemas.microsoft.com/office/drawing/2014/main" id="{BDAA5264-D578-22F8-B106-D3E60E49D0DF}"/>
+              </a:ext>
+            </a:extLst>
+          </p:cNvPr>
+          <p:cNvSpPr txBox="1">
+            <a:spLocks/>
+          </p:cNvSpPr>
+          <p:nvPr/>
+        </p:nvSpPr>
+        <p:spPr>
+          <a:xfrm>
+            <a:off x="673391" y="2748451"/>
+            <a:ext cx="4776615" cy="809065"/>
+          </a:xfrm>
+          <a:prstGeom prst="rect">
+            <a:avLst/>
+          </a:prstGeom>
+        </p:spPr>
+        <p:txBody>
+          <a:bodyPr vert="horz" lIns="91440" tIns="45720" rIns="91440" bIns="45720" rtlCol="0">
+            <a:normAutofit/>
+          </a:bodyPr>
+          <a:lstStyle>
+            <a:lvl1pPr marL="228600" indent="-228600" algn="l" defTabSz="914400" rtl="0" eaLnBrk="1" latinLnBrk="0" hangingPunct="1">
+              <a:lnSpc>
+                <a:spcPct val="90000"/>
+              </a:lnSpc>
+              <a:spcBef>
+                <a:spcPts val="1000"/>
+              </a:spcBef>
+              <a:buFont typeface="Arial" panose="020B0604020202020204" pitchFamily="34" charset="0"/>
+              <a:buChar char="•"/>
+              <a:defRPr sz="2800" kern="1200">
+                <a:solidFill>
+                  <a:schemeClr val="tx1"/>
+                </a:solidFill>
+                <a:latin typeface="+mn-lt"/>
+                <a:ea typeface="+mn-ea"/>
+                <a:cs typeface="+mn-cs"/>
+              </a:defRPr>
+            </a:lvl1pPr>
+            <a:lvl2pPr marL="685800" indent="-228600" algn="l" defTabSz="914400" rtl="0" eaLnBrk="1" latinLnBrk="0" hangingPunct="1">
+              <a:lnSpc>
+                <a:spcPct val="90000"/>
+              </a:lnSpc>
+              <a:spcBef>
+                <a:spcPts val="500"/>
+              </a:spcBef>
+              <a:buFont typeface="Arial" panose="020B0604020202020204" pitchFamily="34" charset="0"/>
+              <a:buChar char="•"/>
+              <a:defRPr sz="2400" kern="1200">
+                <a:solidFill>
+                  <a:schemeClr val="tx1"/>
+                </a:solidFill>
+                <a:latin typeface="+mn-lt"/>
+                <a:ea typeface="+mn-ea"/>
+                <a:cs typeface="+mn-cs"/>
+              </a:defRPr>
+            </a:lvl2pPr>
+            <a:lvl3pPr marL="1143000" indent="-228600" algn="l" defTabSz="914400" rtl="0" eaLnBrk="1" latinLnBrk="0" hangingPunct="1">
+              <a:lnSpc>
+                <a:spcPct val="90000"/>
+              </a:lnSpc>
+              <a:spcBef>
+                <a:spcPts val="500"/>
+              </a:spcBef>
+              <a:buFont typeface="Arial" panose="020B0604020202020204" pitchFamily="34" charset="0"/>
+              <a:buChar char="•"/>
+              <a:defRPr sz="2000" kern="1200">
+                <a:solidFill>
+                  <a:schemeClr val="tx1"/>
+                </a:solidFill>
+                <a:latin typeface="+mn-lt"/>
+                <a:ea typeface="+mn-ea"/>
+                <a:cs typeface="+mn-cs"/>
+              </a:defRPr>
+            </a:lvl3pPr>
+            <a:lvl4pPr marL="1600200" indent="-228600" algn="l" defTabSz="914400" rtl="0" eaLnBrk="1" latinLnBrk="0" hangingPunct="1">
+              <a:lnSpc>
+                <a:spcPct val="90000"/>
+              </a:lnSpc>
+              <a:spcBef>
+                <a:spcPts val="500"/>
+              </a:spcBef>
+              <a:buFont typeface="Arial" panose="020B0604020202020204" pitchFamily="34" charset="0"/>
+              <a:buChar char="•"/>
+              <a:defRPr sz="1800" kern="1200">
+                <a:solidFill>
+                  <a:schemeClr val="tx1"/>
+                </a:solidFill>
+                <a:latin typeface="+mn-lt"/>
+                <a:ea typeface="+mn-ea"/>
+                <a:cs typeface="+mn-cs"/>
+              </a:defRPr>
+            </a:lvl4pPr>
+            <a:lvl5pPr marL="2057400" indent="-228600" algn="l" defTabSz="914400" rtl="0" eaLnBrk="1" latinLnBrk="0" hangingPunct="1">
+              <a:lnSpc>
+                <a:spcPct val="90000"/>
+              </a:lnSpc>
+              <a:spcBef>
+                <a:spcPts val="500"/>
+              </a:spcBef>
+              <a:buFont typeface="Arial" panose="020B0604020202020204" pitchFamily="34" charset="0"/>
+              <a:buChar char="•"/>
+              <a:defRPr sz="1800" kern="1200">
+                <a:solidFill>
+                  <a:schemeClr val="tx1"/>
+                </a:solidFill>
+                <a:latin typeface="+mn-lt"/>
+                <a:ea typeface="+mn-ea"/>
+                <a:cs typeface="+mn-cs"/>
+              </a:defRPr>
+            </a:lvl5pPr>
+            <a:lvl6pPr marL="2514600" indent="-228600" algn="l" defTabSz="914400" rtl="0" eaLnBrk="1" latinLnBrk="0" hangingPunct="1">
+              <a:lnSpc>
+                <a:spcPct val="90000"/>
+              </a:lnSpc>
+              <a:spcBef>
+                <a:spcPts val="500"/>
+              </a:spcBef>
+              <a:buFont typeface="Arial" panose="020B0604020202020204" pitchFamily="34" charset="0"/>
+              <a:buChar char="•"/>
+              <a:defRPr sz="1800" kern="1200">
+                <a:solidFill>
+                  <a:schemeClr val="tx1"/>
+                </a:solidFill>
+                <a:latin typeface="+mn-lt"/>
+                <a:ea typeface="+mn-ea"/>
+                <a:cs typeface="+mn-cs"/>
+              </a:defRPr>
+            </a:lvl6pPr>
+            <a:lvl7pPr marL="2971800" indent="-228600" algn="l" defTabSz="914400" rtl="0" eaLnBrk="1" latinLnBrk="0" hangingPunct="1">
+              <a:lnSpc>
+                <a:spcPct val="90000"/>
+              </a:lnSpc>
+              <a:spcBef>
+                <a:spcPts val="500"/>
+              </a:spcBef>
+              <a:buFont typeface="Arial" panose="020B0604020202020204" pitchFamily="34" charset="0"/>
+              <a:buChar char="•"/>
+              <a:defRPr sz="1800" kern="1200">
+                <a:solidFill>
+                  <a:schemeClr val="tx1"/>
+                </a:solidFill>
+                <a:latin typeface="+mn-lt"/>
+                <a:ea typeface="+mn-ea"/>
+                <a:cs typeface="+mn-cs"/>
+              </a:defRPr>
+            </a:lvl7pPr>
+            <a:lvl8pPr marL="3429000" indent="-228600" algn="l" defTabSz="914400" rtl="0" eaLnBrk="1" latinLnBrk="0" hangingPunct="1">
+              <a:lnSpc>
+                <a:spcPct val="90000"/>
+              </a:lnSpc>
+              <a:spcBef>
+                <a:spcPts val="500"/>
+              </a:spcBef>
+              <a:buFont typeface="Arial" panose="020B0604020202020204" pitchFamily="34" charset="0"/>
+              <a:buChar char="•"/>
+              <a:defRPr sz="1800" kern="1200">
+                <a:solidFill>
+                  <a:schemeClr val="tx1"/>
+                </a:solidFill>
+                <a:latin typeface="+mn-lt"/>
+                <a:ea typeface="+mn-ea"/>
+                <a:cs typeface="+mn-cs"/>
+              </a:defRPr>
+            </a:lvl8pPr>
+            <a:lvl9pPr marL="3886200" indent="-228600" algn="l" defTabSz="914400" rtl="0" eaLnBrk="1" latinLnBrk="0" hangingPunct="1">
+              <a:lnSpc>
+                <a:spcPct val="90000"/>
+              </a:lnSpc>
+              <a:spcBef>
+                <a:spcPts val="500"/>
+              </a:spcBef>
+              <a:buFont typeface="Arial" panose="020B0604020202020204" pitchFamily="34" charset="0"/>
+              <a:buChar char="•"/>
+              <a:defRPr sz="1800" kern="1200">
+                <a:solidFill>
+                  <a:schemeClr val="tx1"/>
+                </a:solidFill>
+                <a:latin typeface="+mn-lt"/>
+                <a:ea typeface="+mn-ea"/>
+                <a:cs typeface="+mn-cs"/>
+              </a:defRPr>
+            </a:lvl9pPr>
+          </a:lstStyle>
+          <a:p>
+            <a:pPr marL="0" indent="0">
+              <a:buFont typeface="Arial" panose="020B0604020202020204" pitchFamily="34" charset="0"/>
+              <a:buNone/>
+            </a:pPr>
+            <a:r>
+              <a:rPr lang="en-US" sz="1800" b="1" dirty="0"/>
+              <a:t>Answer – </a:t>
+            </a:r>
+            <a:r>
+              <a:rPr lang="en-US" sz="1800" dirty="0"/>
+              <a:t>108 players exist in all Games</a:t>
+            </a:r>
+          </a:p>
+        </p:txBody>
+      </p:sp>
+      <p:pic>
+        <p:nvPicPr>
+          <p:cNvPr id="7" name="Picture 6">
+            <a:extLst>
+              <a:ext uri="{FF2B5EF4-FFF2-40B4-BE49-F238E27FC236}">
+                <a16:creationId xmlns:a16="http://schemas.microsoft.com/office/drawing/2014/main" id="{5CA51891-00C9-3230-35FE-D2E9A164F911}"/>
+              </a:ext>
+            </a:extLst>
+          </p:cNvPr>
+          <p:cNvPicPr>
+            <a:picLocks noChangeAspect="1"/>
+          </p:cNvPicPr>
+          <p:nvPr/>
+        </p:nvPicPr>
+        <p:blipFill>
+          <a:blip r:embed="rId2"/>
+          <a:stretch>
+            <a:fillRect/>
+          </a:stretch>
+        </p:blipFill>
+        <p:spPr>
+          <a:xfrm>
+            <a:off x="6574931" y="1416771"/>
+            <a:ext cx="5342083" cy="5156901"/>
+          </a:xfrm>
+          <a:prstGeom prst="rect">
+            <a:avLst/>
+          </a:prstGeom>
+        </p:spPr>
+      </p:pic>
+      <p:pic>
+        <p:nvPicPr>
+          <p:cNvPr id="9" name="Picture 8">
+            <a:extLst>
+              <a:ext uri="{FF2B5EF4-FFF2-40B4-BE49-F238E27FC236}">
+                <a16:creationId xmlns:a16="http://schemas.microsoft.com/office/drawing/2014/main" id="{750FA825-C5A3-9CC4-F440-CC57CB868354}"/>
+              </a:ext>
+            </a:extLst>
+          </p:cNvPr>
+          <p:cNvPicPr>
+            <a:picLocks noChangeAspect="1"/>
+          </p:cNvPicPr>
+          <p:nvPr/>
+        </p:nvPicPr>
+        <p:blipFill>
+          <a:blip r:embed="rId3"/>
+          <a:stretch>
+            <a:fillRect/>
+          </a:stretch>
+        </p:blipFill>
+        <p:spPr>
+          <a:xfrm>
+            <a:off x="637387" y="3906640"/>
+            <a:ext cx="4408552" cy="762066"/>
+          </a:xfrm>
+          <a:prstGeom prst="rect">
+            <a:avLst/>
+          </a:prstGeom>
+        </p:spPr>
+      </p:pic>
+    </p:spTree>
+    <p:extLst>
+      <p:ext uri="{BB962C8B-B14F-4D97-AF65-F5344CB8AC3E}">
+        <p14:creationId xmlns:p14="http://schemas.microsoft.com/office/powerpoint/2010/main" val="21693804"/>
+      </p:ext>
+    </p:extLst>
+  </p:cSld>
+  <p:clrMapOvr>
+    <a:masterClrMapping/>
+  </p:clrMapOvr>
+</p:sld>
+</file>
+
+<file path=ppt/slides/slide18.xml><?xml version="1.0" encoding="utf-8"?>
+<p:sld xmlns:a="http://schemas.openxmlformats.org/drawingml/2006/main" xmlns:r="http://schemas.openxmlformats.org/officeDocument/2006/relationships" xmlns:p="http://schemas.openxmlformats.org/presentationml/2006/main">
+  <p:cSld>
+    <p:spTree>
+      <p:nvGrpSpPr>
+        <p:cNvPr id="1" name=""/>
+        <p:cNvGrpSpPr/>
+        <p:nvPr/>
+      </p:nvGrpSpPr>
+      <p:grpSpPr>
+        <a:xfrm>
+          <a:off x="0" y="0"/>
+          <a:ext cx="0" cy="0"/>
+          <a:chOff x="0" y="0"/>
+          <a:chExt cx="0" cy="0"/>
+        </a:xfrm>
+      </p:grpSpPr>
+      <p:sp>
+        <p:nvSpPr>
+          <p:cNvPr id="4" name="TextBox 3">
+            <a:extLst>
+              <a:ext uri="{FF2B5EF4-FFF2-40B4-BE49-F238E27FC236}">
+                <a16:creationId xmlns:a16="http://schemas.microsoft.com/office/drawing/2014/main" id="{A48799DE-1563-519F-5751-7995A485ED47}"/>
+              </a:ext>
+            </a:extLst>
+          </p:cNvPr>
+          <p:cNvSpPr txBox="1"/>
+          <p:nvPr/>
+        </p:nvSpPr>
+        <p:spPr>
+          <a:xfrm>
+            <a:off x="637387" y="323529"/>
+            <a:ext cx="11304403" cy="369332"/>
+          </a:xfrm>
+          <a:prstGeom prst="rect">
+            <a:avLst/>
+          </a:prstGeom>
+          <a:noFill/>
+        </p:spPr>
+        <p:txBody>
+          <a:bodyPr wrap="square" rtlCol="0">
+            <a:spAutoFit/>
+          </a:bodyPr>
+          <a:lstStyle/>
+          <a:p>
+            <a:pPr algn="l" rtl="0"/>
+            <a:r>
+              <a:rPr lang="en-US" b="1" dirty="0"/>
+              <a:t>Question 4.2 - </a:t>
+            </a:r>
+            <a:r>
+              <a:rPr lang="en-US" b="1" i="0" dirty="0">
+                <a:solidFill>
+                  <a:srgbClr val="091E42"/>
+                </a:solidFill>
+                <a:effectLst/>
+                <a:latin typeface="freight-text-pro"/>
+              </a:rPr>
+              <a:t>Player-level aggregation - </a:t>
+            </a:r>
+            <a:r>
+              <a:rPr lang="en-US" b="0" i="0" dirty="0">
+                <a:solidFill>
+                  <a:srgbClr val="091E42"/>
+                </a:solidFill>
+                <a:effectLst/>
+                <a:latin typeface="freight-text-pro"/>
+              </a:rPr>
+              <a:t>Who is the best crew member?</a:t>
+            </a:r>
+          </a:p>
+        </p:txBody>
+      </p:sp>
+      <p:sp>
+        <p:nvSpPr>
+          <p:cNvPr id="3" name="Content Placeholder 2">
+            <a:extLst>
+              <a:ext uri="{FF2B5EF4-FFF2-40B4-BE49-F238E27FC236}">
+                <a16:creationId xmlns:a16="http://schemas.microsoft.com/office/drawing/2014/main" id="{4677FA30-90FF-75D7-7DB9-8E36155EF675}"/>
+              </a:ext>
+            </a:extLst>
+          </p:cNvPr>
+          <p:cNvSpPr>
+            <a:spLocks noGrp="1"/>
+          </p:cNvSpPr>
+          <p:nvPr>
+            <p:ph idx="1"/>
+          </p:nvPr>
+        </p:nvSpPr>
+        <p:spPr>
+          <a:xfrm>
+            <a:off x="673391" y="1518523"/>
+            <a:ext cx="10089107" cy="744703"/>
+          </a:xfrm>
+        </p:spPr>
+        <p:txBody>
+          <a:bodyPr>
+            <a:normAutofit/>
+          </a:bodyPr>
+          <a:lstStyle/>
+          <a:p>
+            <a:pPr marL="0" indent="0">
+              <a:buNone/>
+            </a:pPr>
+            <a:r>
+              <a:rPr lang="en-US" sz="1800" b="1" dirty="0"/>
+              <a:t>Command –</a:t>
+            </a:r>
+            <a:r>
+              <a:rPr lang="en-US" sz="1800" dirty="0"/>
+              <a:t> </a:t>
+            </a:r>
+          </a:p>
+        </p:txBody>
+      </p:sp>
+      <p:sp>
+        <p:nvSpPr>
+          <p:cNvPr id="6" name="Content Placeholder 2">
+            <a:extLst>
+              <a:ext uri="{FF2B5EF4-FFF2-40B4-BE49-F238E27FC236}">
+                <a16:creationId xmlns:a16="http://schemas.microsoft.com/office/drawing/2014/main" id="{BDAA5264-D578-22F8-B106-D3E60E49D0DF}"/>
+              </a:ext>
+            </a:extLst>
+          </p:cNvPr>
+          <p:cNvSpPr txBox="1">
+            <a:spLocks/>
+          </p:cNvSpPr>
+          <p:nvPr/>
+        </p:nvSpPr>
+        <p:spPr>
+          <a:xfrm>
+            <a:off x="673391" y="2748451"/>
+            <a:ext cx="4776615" cy="2951764"/>
+          </a:xfrm>
+          <a:prstGeom prst="rect">
+            <a:avLst/>
+          </a:prstGeom>
+        </p:spPr>
+        <p:txBody>
+          <a:bodyPr vert="horz" lIns="91440" tIns="45720" rIns="91440" bIns="45720" rtlCol="0">
+            <a:normAutofit/>
+          </a:bodyPr>
+          <a:lstStyle>
+            <a:lvl1pPr marL="228600" indent="-228600" algn="l" defTabSz="914400" rtl="0" eaLnBrk="1" latinLnBrk="0" hangingPunct="1">
+              <a:lnSpc>
+                <a:spcPct val="90000"/>
+              </a:lnSpc>
+              <a:spcBef>
+                <a:spcPts val="1000"/>
+              </a:spcBef>
+              <a:buFont typeface="Arial" panose="020B0604020202020204" pitchFamily="34" charset="0"/>
+              <a:buChar char="•"/>
+              <a:defRPr sz="2800" kern="1200">
+                <a:solidFill>
+                  <a:schemeClr val="tx1"/>
+                </a:solidFill>
+                <a:latin typeface="+mn-lt"/>
+                <a:ea typeface="+mn-ea"/>
+                <a:cs typeface="+mn-cs"/>
+              </a:defRPr>
+            </a:lvl1pPr>
+            <a:lvl2pPr marL="685800" indent="-228600" algn="l" defTabSz="914400" rtl="0" eaLnBrk="1" latinLnBrk="0" hangingPunct="1">
+              <a:lnSpc>
+                <a:spcPct val="90000"/>
+              </a:lnSpc>
+              <a:spcBef>
+                <a:spcPts val="500"/>
+              </a:spcBef>
+              <a:buFont typeface="Arial" panose="020B0604020202020204" pitchFamily="34" charset="0"/>
+              <a:buChar char="•"/>
+              <a:defRPr sz="2400" kern="1200">
+                <a:solidFill>
+                  <a:schemeClr val="tx1"/>
+                </a:solidFill>
+                <a:latin typeface="+mn-lt"/>
+                <a:ea typeface="+mn-ea"/>
+                <a:cs typeface="+mn-cs"/>
+              </a:defRPr>
+            </a:lvl2pPr>
+            <a:lvl3pPr marL="1143000" indent="-228600" algn="l" defTabSz="914400" rtl="0" eaLnBrk="1" latinLnBrk="0" hangingPunct="1">
+              <a:lnSpc>
+                <a:spcPct val="90000"/>
+              </a:lnSpc>
+              <a:spcBef>
+                <a:spcPts val="500"/>
+              </a:spcBef>
+              <a:buFont typeface="Arial" panose="020B0604020202020204" pitchFamily="34" charset="0"/>
+              <a:buChar char="•"/>
+              <a:defRPr sz="2000" kern="1200">
+                <a:solidFill>
+                  <a:schemeClr val="tx1"/>
+                </a:solidFill>
+                <a:latin typeface="+mn-lt"/>
+                <a:ea typeface="+mn-ea"/>
+                <a:cs typeface="+mn-cs"/>
+              </a:defRPr>
+            </a:lvl3pPr>
+            <a:lvl4pPr marL="1600200" indent="-228600" algn="l" defTabSz="914400" rtl="0" eaLnBrk="1" latinLnBrk="0" hangingPunct="1">
+              <a:lnSpc>
+                <a:spcPct val="90000"/>
+              </a:lnSpc>
+              <a:spcBef>
+                <a:spcPts val="500"/>
+              </a:spcBef>
+              <a:buFont typeface="Arial" panose="020B0604020202020204" pitchFamily="34" charset="0"/>
+              <a:buChar char="•"/>
+              <a:defRPr sz="1800" kern="1200">
+                <a:solidFill>
+                  <a:schemeClr val="tx1"/>
+                </a:solidFill>
+                <a:latin typeface="+mn-lt"/>
+                <a:ea typeface="+mn-ea"/>
+                <a:cs typeface="+mn-cs"/>
+              </a:defRPr>
+            </a:lvl4pPr>
+            <a:lvl5pPr marL="2057400" indent="-228600" algn="l" defTabSz="914400" rtl="0" eaLnBrk="1" latinLnBrk="0" hangingPunct="1">
+              <a:lnSpc>
+                <a:spcPct val="90000"/>
+              </a:lnSpc>
+              <a:spcBef>
+                <a:spcPts val="500"/>
+              </a:spcBef>
+              <a:buFont typeface="Arial" panose="020B0604020202020204" pitchFamily="34" charset="0"/>
+              <a:buChar char="•"/>
+              <a:defRPr sz="1800" kern="1200">
+                <a:solidFill>
+                  <a:schemeClr val="tx1"/>
+                </a:solidFill>
+                <a:latin typeface="+mn-lt"/>
+                <a:ea typeface="+mn-ea"/>
+                <a:cs typeface="+mn-cs"/>
+              </a:defRPr>
+            </a:lvl5pPr>
+            <a:lvl6pPr marL="2514600" indent="-228600" algn="l" defTabSz="914400" rtl="0" eaLnBrk="1" latinLnBrk="0" hangingPunct="1">
+              <a:lnSpc>
+                <a:spcPct val="90000"/>
+              </a:lnSpc>
+              <a:spcBef>
+                <a:spcPts val="500"/>
+              </a:spcBef>
+              <a:buFont typeface="Arial" panose="020B0604020202020204" pitchFamily="34" charset="0"/>
+              <a:buChar char="•"/>
+              <a:defRPr sz="1800" kern="1200">
+                <a:solidFill>
+                  <a:schemeClr val="tx1"/>
+                </a:solidFill>
+                <a:latin typeface="+mn-lt"/>
+                <a:ea typeface="+mn-ea"/>
+                <a:cs typeface="+mn-cs"/>
+              </a:defRPr>
+            </a:lvl6pPr>
+            <a:lvl7pPr marL="2971800" indent="-228600" algn="l" defTabSz="914400" rtl="0" eaLnBrk="1" latinLnBrk="0" hangingPunct="1">
+              <a:lnSpc>
+                <a:spcPct val="90000"/>
+              </a:lnSpc>
+              <a:spcBef>
+                <a:spcPts val="500"/>
+              </a:spcBef>
+              <a:buFont typeface="Arial" panose="020B0604020202020204" pitchFamily="34" charset="0"/>
+              <a:buChar char="•"/>
+              <a:defRPr sz="1800" kern="1200">
+                <a:solidFill>
+                  <a:schemeClr val="tx1"/>
+                </a:solidFill>
+                <a:latin typeface="+mn-lt"/>
+                <a:ea typeface="+mn-ea"/>
+                <a:cs typeface="+mn-cs"/>
+              </a:defRPr>
+            </a:lvl7pPr>
+            <a:lvl8pPr marL="3429000" indent="-228600" algn="l" defTabSz="914400" rtl="0" eaLnBrk="1" latinLnBrk="0" hangingPunct="1">
+              <a:lnSpc>
+                <a:spcPct val="90000"/>
+              </a:lnSpc>
+              <a:spcBef>
+                <a:spcPts val="500"/>
+              </a:spcBef>
+              <a:buFont typeface="Arial" panose="020B0604020202020204" pitchFamily="34" charset="0"/>
+              <a:buChar char="•"/>
+              <a:defRPr sz="1800" kern="1200">
+                <a:solidFill>
+                  <a:schemeClr val="tx1"/>
+                </a:solidFill>
+                <a:latin typeface="+mn-lt"/>
+                <a:ea typeface="+mn-ea"/>
+                <a:cs typeface="+mn-cs"/>
+              </a:defRPr>
+            </a:lvl8pPr>
+            <a:lvl9pPr marL="3886200" indent="-228600" algn="l" defTabSz="914400" rtl="0" eaLnBrk="1" latinLnBrk="0" hangingPunct="1">
+              <a:lnSpc>
+                <a:spcPct val="90000"/>
+              </a:lnSpc>
+              <a:spcBef>
+                <a:spcPts val="500"/>
+              </a:spcBef>
+              <a:buFont typeface="Arial" panose="020B0604020202020204" pitchFamily="34" charset="0"/>
+              <a:buChar char="•"/>
+              <a:defRPr sz="1800" kern="1200">
+                <a:solidFill>
+                  <a:schemeClr val="tx1"/>
+                </a:solidFill>
+                <a:latin typeface="+mn-lt"/>
+                <a:ea typeface="+mn-ea"/>
+                <a:cs typeface="+mn-cs"/>
+              </a:defRPr>
+            </a:lvl9pPr>
+          </a:lstStyle>
+          <a:p>
+            <a:pPr marL="0" indent="0">
+              <a:buFont typeface="Arial" panose="020B0604020202020204" pitchFamily="34" charset="0"/>
+              <a:buNone/>
+            </a:pPr>
+            <a:r>
+              <a:rPr lang="en-US" sz="1800" b="1" dirty="0"/>
+              <a:t>Answer – </a:t>
+            </a:r>
+            <a:endParaRPr lang="en-US" sz="1800" dirty="0"/>
+          </a:p>
+        </p:txBody>
+      </p:sp>
+    </p:spTree>
+    <p:extLst>
+      <p:ext uri="{BB962C8B-B14F-4D97-AF65-F5344CB8AC3E}">
+        <p14:creationId xmlns:p14="http://schemas.microsoft.com/office/powerpoint/2010/main" val="1432019001"/>
+      </p:ext>
+    </p:extLst>
+  </p:cSld>
+  <p:clrMapOvr>
+    <a:masterClrMapping/>
+  </p:clrMapOvr>
+</p:sld>
+</file>
+
+<file path=ppt/slides/slide19.xml><?xml version="1.0" encoding="utf-8"?>
+<p:sld xmlns:a="http://schemas.openxmlformats.org/drawingml/2006/main" xmlns:r="http://schemas.openxmlformats.org/officeDocument/2006/relationships" xmlns:p="http://schemas.openxmlformats.org/presentationml/2006/main">
+  <p:cSld>
+    <p:spTree>
+      <p:nvGrpSpPr>
+        <p:cNvPr id="1" name=""/>
+        <p:cNvGrpSpPr/>
+        <p:nvPr/>
+      </p:nvGrpSpPr>
+      <p:grpSpPr>
+        <a:xfrm>
+          <a:off x="0" y="0"/>
+          <a:ext cx="0" cy="0"/>
+          <a:chOff x="0" y="0"/>
+          <a:chExt cx="0" cy="0"/>
+        </a:xfrm>
+      </p:grpSpPr>
+      <p:sp>
+        <p:nvSpPr>
+          <p:cNvPr id="4" name="TextBox 3">
+            <a:extLst>
+              <a:ext uri="{FF2B5EF4-FFF2-40B4-BE49-F238E27FC236}">
+                <a16:creationId xmlns:a16="http://schemas.microsoft.com/office/drawing/2014/main" id="{A48799DE-1563-519F-5751-7995A485ED47}"/>
+              </a:ext>
+            </a:extLst>
+          </p:cNvPr>
+          <p:cNvSpPr txBox="1"/>
+          <p:nvPr/>
+        </p:nvSpPr>
+        <p:spPr>
+          <a:xfrm>
+            <a:off x="637387" y="323529"/>
+            <a:ext cx="11304403" cy="369332"/>
+          </a:xfrm>
+          <a:prstGeom prst="rect">
+            <a:avLst/>
+          </a:prstGeom>
+          <a:noFill/>
+        </p:spPr>
+        <p:txBody>
+          <a:bodyPr wrap="square" rtlCol="0">
+            <a:spAutoFit/>
+          </a:bodyPr>
+          <a:lstStyle/>
+          <a:p>
+            <a:pPr algn="l" rtl="0"/>
+            <a:r>
+              <a:rPr lang="en-US" b="1" dirty="0"/>
+              <a:t>Question 4.3 - </a:t>
+            </a:r>
+            <a:r>
+              <a:rPr lang="en-US" b="1" i="0" dirty="0">
+                <a:solidFill>
+                  <a:srgbClr val="091E42"/>
+                </a:solidFill>
+                <a:effectLst/>
+                <a:latin typeface="freight-text-pro"/>
+              </a:rPr>
+              <a:t>Player-level aggregation - </a:t>
+            </a:r>
+            <a:r>
+              <a:rPr lang="en-US" b="0" i="0" dirty="0">
+                <a:solidFill>
+                  <a:srgbClr val="091E42"/>
+                </a:solidFill>
+                <a:effectLst/>
+                <a:latin typeface="freight-text-pro"/>
+              </a:rPr>
+              <a:t>Who is the worst crew member?</a:t>
+            </a:r>
+          </a:p>
+        </p:txBody>
+      </p:sp>
+      <p:sp>
+        <p:nvSpPr>
+          <p:cNvPr id="3" name="Content Placeholder 2">
+            <a:extLst>
+              <a:ext uri="{FF2B5EF4-FFF2-40B4-BE49-F238E27FC236}">
+                <a16:creationId xmlns:a16="http://schemas.microsoft.com/office/drawing/2014/main" id="{4677FA30-90FF-75D7-7DB9-8E36155EF675}"/>
+              </a:ext>
+            </a:extLst>
+          </p:cNvPr>
+          <p:cNvSpPr>
+            <a:spLocks noGrp="1"/>
+          </p:cNvSpPr>
+          <p:nvPr>
+            <p:ph idx="1"/>
+          </p:nvPr>
+        </p:nvSpPr>
+        <p:spPr>
+          <a:xfrm>
+            <a:off x="673391" y="1518523"/>
+            <a:ext cx="10089107" cy="744703"/>
+          </a:xfrm>
+        </p:spPr>
+        <p:txBody>
+          <a:bodyPr>
+            <a:normAutofit/>
+          </a:bodyPr>
+          <a:lstStyle/>
+          <a:p>
+            <a:pPr marL="0" indent="0">
+              <a:buNone/>
+            </a:pPr>
+            <a:r>
+              <a:rPr lang="en-US" sz="1800" b="1" dirty="0"/>
+              <a:t>Command –</a:t>
+            </a:r>
+            <a:r>
+              <a:rPr lang="en-US" sz="1800" dirty="0"/>
+              <a:t> </a:t>
+            </a:r>
+          </a:p>
+        </p:txBody>
+      </p:sp>
+      <p:sp>
+        <p:nvSpPr>
+          <p:cNvPr id="6" name="Content Placeholder 2">
+            <a:extLst>
+              <a:ext uri="{FF2B5EF4-FFF2-40B4-BE49-F238E27FC236}">
+                <a16:creationId xmlns:a16="http://schemas.microsoft.com/office/drawing/2014/main" id="{BDAA5264-D578-22F8-B106-D3E60E49D0DF}"/>
+              </a:ext>
+            </a:extLst>
+          </p:cNvPr>
+          <p:cNvSpPr txBox="1">
+            <a:spLocks/>
+          </p:cNvSpPr>
+          <p:nvPr/>
+        </p:nvSpPr>
+        <p:spPr>
+          <a:xfrm>
+            <a:off x="673391" y="2748451"/>
+            <a:ext cx="4776615" cy="2951764"/>
+          </a:xfrm>
+          <a:prstGeom prst="rect">
+            <a:avLst/>
+          </a:prstGeom>
+        </p:spPr>
+        <p:txBody>
+          <a:bodyPr vert="horz" lIns="91440" tIns="45720" rIns="91440" bIns="45720" rtlCol="0">
+            <a:normAutofit/>
+          </a:bodyPr>
+          <a:lstStyle>
+            <a:lvl1pPr marL="228600" indent="-228600" algn="l" defTabSz="914400" rtl="0" eaLnBrk="1" latinLnBrk="0" hangingPunct="1">
+              <a:lnSpc>
+                <a:spcPct val="90000"/>
+              </a:lnSpc>
+              <a:spcBef>
+                <a:spcPts val="1000"/>
+              </a:spcBef>
+              <a:buFont typeface="Arial" panose="020B0604020202020204" pitchFamily="34" charset="0"/>
+              <a:buChar char="•"/>
+              <a:defRPr sz="2800" kern="1200">
+                <a:solidFill>
+                  <a:schemeClr val="tx1"/>
+                </a:solidFill>
+                <a:latin typeface="+mn-lt"/>
+                <a:ea typeface="+mn-ea"/>
+                <a:cs typeface="+mn-cs"/>
+              </a:defRPr>
+            </a:lvl1pPr>
+            <a:lvl2pPr marL="685800" indent="-228600" algn="l" defTabSz="914400" rtl="0" eaLnBrk="1" latinLnBrk="0" hangingPunct="1">
+              <a:lnSpc>
+                <a:spcPct val="90000"/>
+              </a:lnSpc>
+              <a:spcBef>
+                <a:spcPts val="500"/>
+              </a:spcBef>
+              <a:buFont typeface="Arial" panose="020B0604020202020204" pitchFamily="34" charset="0"/>
+              <a:buChar char="•"/>
+              <a:defRPr sz="2400" kern="1200">
+                <a:solidFill>
+                  <a:schemeClr val="tx1"/>
+                </a:solidFill>
+                <a:latin typeface="+mn-lt"/>
+                <a:ea typeface="+mn-ea"/>
+                <a:cs typeface="+mn-cs"/>
+              </a:defRPr>
+            </a:lvl2pPr>
+            <a:lvl3pPr marL="1143000" indent="-228600" algn="l" defTabSz="914400" rtl="0" eaLnBrk="1" latinLnBrk="0" hangingPunct="1">
+              <a:lnSpc>
+                <a:spcPct val="90000"/>
+              </a:lnSpc>
+              <a:spcBef>
+                <a:spcPts val="500"/>
+              </a:spcBef>
+              <a:buFont typeface="Arial" panose="020B0604020202020204" pitchFamily="34" charset="0"/>
+              <a:buChar char="•"/>
+              <a:defRPr sz="2000" kern="1200">
+                <a:solidFill>
+                  <a:schemeClr val="tx1"/>
+                </a:solidFill>
+                <a:latin typeface="+mn-lt"/>
+                <a:ea typeface="+mn-ea"/>
+                <a:cs typeface="+mn-cs"/>
+              </a:defRPr>
+            </a:lvl3pPr>
+            <a:lvl4pPr marL="1600200" indent="-228600" algn="l" defTabSz="914400" rtl="0" eaLnBrk="1" latinLnBrk="0" hangingPunct="1">
+              <a:lnSpc>
+                <a:spcPct val="90000"/>
+              </a:lnSpc>
+              <a:spcBef>
+                <a:spcPts val="500"/>
+              </a:spcBef>
+              <a:buFont typeface="Arial" panose="020B0604020202020204" pitchFamily="34" charset="0"/>
+              <a:buChar char="•"/>
+              <a:defRPr sz="1800" kern="1200">
+                <a:solidFill>
+                  <a:schemeClr val="tx1"/>
+                </a:solidFill>
+                <a:latin typeface="+mn-lt"/>
+                <a:ea typeface="+mn-ea"/>
+                <a:cs typeface="+mn-cs"/>
+              </a:defRPr>
+            </a:lvl4pPr>
+            <a:lvl5pPr marL="2057400" indent="-228600" algn="l" defTabSz="914400" rtl="0" eaLnBrk="1" latinLnBrk="0" hangingPunct="1">
+              <a:lnSpc>
+                <a:spcPct val="90000"/>
+              </a:lnSpc>
+              <a:spcBef>
+                <a:spcPts val="500"/>
+              </a:spcBef>
+              <a:buFont typeface="Arial" panose="020B0604020202020204" pitchFamily="34" charset="0"/>
+              <a:buChar char="•"/>
+              <a:defRPr sz="1800" kern="1200">
+                <a:solidFill>
+                  <a:schemeClr val="tx1"/>
+                </a:solidFill>
+                <a:latin typeface="+mn-lt"/>
+                <a:ea typeface="+mn-ea"/>
+                <a:cs typeface="+mn-cs"/>
+              </a:defRPr>
+            </a:lvl5pPr>
+            <a:lvl6pPr marL="2514600" indent="-228600" algn="l" defTabSz="914400" rtl="0" eaLnBrk="1" latinLnBrk="0" hangingPunct="1">
+              <a:lnSpc>
+                <a:spcPct val="90000"/>
+              </a:lnSpc>
+              <a:spcBef>
+                <a:spcPts val="500"/>
+              </a:spcBef>
+              <a:buFont typeface="Arial" panose="020B0604020202020204" pitchFamily="34" charset="0"/>
+              <a:buChar char="•"/>
+              <a:defRPr sz="1800" kern="1200">
+                <a:solidFill>
+                  <a:schemeClr val="tx1"/>
+                </a:solidFill>
+                <a:latin typeface="+mn-lt"/>
+                <a:ea typeface="+mn-ea"/>
+                <a:cs typeface="+mn-cs"/>
+              </a:defRPr>
+            </a:lvl6pPr>
+            <a:lvl7pPr marL="2971800" indent="-228600" algn="l" defTabSz="914400" rtl="0" eaLnBrk="1" latinLnBrk="0" hangingPunct="1">
+              <a:lnSpc>
+                <a:spcPct val="90000"/>
+              </a:lnSpc>
+              <a:spcBef>
+                <a:spcPts val="500"/>
+              </a:spcBef>
+              <a:buFont typeface="Arial" panose="020B0604020202020204" pitchFamily="34" charset="0"/>
+              <a:buChar char="•"/>
+              <a:defRPr sz="1800" kern="1200">
+                <a:solidFill>
+                  <a:schemeClr val="tx1"/>
+                </a:solidFill>
+                <a:latin typeface="+mn-lt"/>
+                <a:ea typeface="+mn-ea"/>
+                <a:cs typeface="+mn-cs"/>
+              </a:defRPr>
+            </a:lvl7pPr>
+            <a:lvl8pPr marL="3429000" indent="-228600" algn="l" defTabSz="914400" rtl="0" eaLnBrk="1" latinLnBrk="0" hangingPunct="1">
+              <a:lnSpc>
+                <a:spcPct val="90000"/>
+              </a:lnSpc>
+              <a:spcBef>
+                <a:spcPts val="500"/>
+              </a:spcBef>
+              <a:buFont typeface="Arial" panose="020B0604020202020204" pitchFamily="34" charset="0"/>
+              <a:buChar char="•"/>
+              <a:defRPr sz="1800" kern="1200">
+                <a:solidFill>
+                  <a:schemeClr val="tx1"/>
+                </a:solidFill>
+                <a:latin typeface="+mn-lt"/>
+                <a:ea typeface="+mn-ea"/>
+                <a:cs typeface="+mn-cs"/>
+              </a:defRPr>
+            </a:lvl8pPr>
+            <a:lvl9pPr marL="3886200" indent="-228600" algn="l" defTabSz="914400" rtl="0" eaLnBrk="1" latinLnBrk="0" hangingPunct="1">
+              <a:lnSpc>
+                <a:spcPct val="90000"/>
+              </a:lnSpc>
+              <a:spcBef>
+                <a:spcPts val="500"/>
+              </a:spcBef>
+              <a:buFont typeface="Arial" panose="020B0604020202020204" pitchFamily="34" charset="0"/>
+              <a:buChar char="•"/>
+              <a:defRPr sz="1800" kern="1200">
+                <a:solidFill>
+                  <a:schemeClr val="tx1"/>
+                </a:solidFill>
+                <a:latin typeface="+mn-lt"/>
+                <a:ea typeface="+mn-ea"/>
+                <a:cs typeface="+mn-cs"/>
+              </a:defRPr>
+            </a:lvl9pPr>
+          </a:lstStyle>
+          <a:p>
+            <a:pPr marL="0" indent="0">
+              <a:buFont typeface="Arial" panose="020B0604020202020204" pitchFamily="34" charset="0"/>
+              <a:buNone/>
+            </a:pPr>
+            <a:r>
+              <a:rPr lang="en-US" sz="1800" b="1" dirty="0"/>
+              <a:t>Answer – </a:t>
+            </a:r>
+            <a:endParaRPr lang="en-US" sz="1800" dirty="0"/>
+          </a:p>
+        </p:txBody>
+      </p:sp>
+    </p:spTree>
+    <p:extLst>
+      <p:ext uri="{BB962C8B-B14F-4D97-AF65-F5344CB8AC3E}">
+        <p14:creationId xmlns:p14="http://schemas.microsoft.com/office/powerpoint/2010/main" val="1303603229"/>
+      </p:ext>
+    </p:extLst>
+  </p:cSld>
+  <p:clrMapOvr>
+    <a:masterClrMapping/>
+  </p:clrMapOvr>
+</p:sld>
+</file>
+
 <file path=ppt/slides/slide2.xml><?xml version="1.0" encoding="utf-8"?>
 <p:sld xmlns:a="http://schemas.openxmlformats.org/drawingml/2006/main" xmlns:r="http://schemas.openxmlformats.org/officeDocument/2006/relationships" xmlns:p="http://schemas.openxmlformats.org/presentationml/2006/main">
   <p:cSld>
@@ -6482,6 +7588,115 @@
     <p:extLst>
       <p:ext uri="{BB962C8B-B14F-4D97-AF65-F5344CB8AC3E}">
         <p14:creationId xmlns:p14="http://schemas.microsoft.com/office/powerpoint/2010/main" val="1735570203"/>
+      </p:ext>
+    </p:extLst>
+  </p:cSld>
+  <p:clrMapOvr>
+    <a:masterClrMapping/>
+  </p:clrMapOvr>
+</p:sld>
+</file>
+
+<file path=ppt/slides/slide20.xml><?xml version="1.0" encoding="utf-8"?>
+<p:sld xmlns:a="http://schemas.openxmlformats.org/drawingml/2006/main" xmlns:r="http://schemas.openxmlformats.org/officeDocument/2006/relationships" xmlns:p="http://schemas.openxmlformats.org/presentationml/2006/main">
+  <p:cSld>
+    <p:spTree>
+      <p:nvGrpSpPr>
+        <p:cNvPr id="1" name=""/>
+        <p:cNvGrpSpPr/>
+        <p:nvPr/>
+      </p:nvGrpSpPr>
+      <p:grpSpPr>
+        <a:xfrm>
+          <a:off x="0" y="0"/>
+          <a:ext cx="0" cy="0"/>
+          <a:chOff x="0" y="0"/>
+          <a:chExt cx="0" cy="0"/>
+        </a:xfrm>
+      </p:grpSpPr>
+      <p:sp>
+        <p:nvSpPr>
+          <p:cNvPr id="4" name="TextBox 3">
+            <a:extLst>
+              <a:ext uri="{FF2B5EF4-FFF2-40B4-BE49-F238E27FC236}">
+                <a16:creationId xmlns:a16="http://schemas.microsoft.com/office/drawing/2014/main" id="{A48799DE-1563-519F-5751-7995A485ED47}"/>
+              </a:ext>
+            </a:extLst>
+          </p:cNvPr>
+          <p:cNvSpPr txBox="1"/>
+          <p:nvPr/>
+        </p:nvSpPr>
+        <p:spPr>
+          <a:xfrm>
+            <a:off x="637387" y="323529"/>
+            <a:ext cx="11304403" cy="646331"/>
+          </a:xfrm>
+          <a:prstGeom prst="rect">
+            <a:avLst/>
+          </a:prstGeom>
+          <a:noFill/>
+        </p:spPr>
+        <p:txBody>
+          <a:bodyPr wrap="square" rtlCol="0">
+            <a:spAutoFit/>
+          </a:bodyPr>
+          <a:lstStyle/>
+          <a:p>
+            <a:pPr algn="l" rtl="0"/>
+            <a:r>
+              <a:rPr lang="en-US" b="1" dirty="0"/>
+              <a:t>Question 6 - </a:t>
+            </a:r>
+            <a:r>
+              <a:rPr lang="en-US" b="0" i="0" dirty="0">
+                <a:solidFill>
+                  <a:srgbClr val="091E42"/>
+                </a:solidFill>
+                <a:effectLst/>
+                <a:latin typeface="freight-text-pro"/>
+              </a:rPr>
+              <a:t>In tasks 4 and 5 you create some player-wise statistics. Explain statistics that you might want to explore (other than the ones that were calculated earlier) during the exercise of selecting players. </a:t>
+            </a:r>
+          </a:p>
+        </p:txBody>
+      </p:sp>
+      <p:sp>
+        <p:nvSpPr>
+          <p:cNvPr id="5" name="Content Placeholder 4">
+            <a:extLst>
+              <a:ext uri="{FF2B5EF4-FFF2-40B4-BE49-F238E27FC236}">
+                <a16:creationId xmlns:a16="http://schemas.microsoft.com/office/drawing/2014/main" id="{E7460D98-9D2B-52F7-DC97-D9605DFE4022}"/>
+              </a:ext>
+            </a:extLst>
+          </p:cNvPr>
+          <p:cNvSpPr>
+            <a:spLocks noGrp="1"/>
+          </p:cNvSpPr>
+          <p:nvPr>
+            <p:ph idx="1"/>
+          </p:nvPr>
+        </p:nvSpPr>
+        <p:spPr>
+          <a:xfrm>
+            <a:off x="838200" y="1825625"/>
+            <a:ext cx="10515600" cy="799294"/>
+          </a:xfrm>
+        </p:spPr>
+        <p:txBody>
+          <a:bodyPr/>
+          <a:lstStyle/>
+          <a:p>
+            <a:r>
+              <a:rPr lang="en-US" dirty="0"/>
+              <a:t>Answer - &lt;open ended Question&gt;</a:t>
+            </a:r>
+          </a:p>
+        </p:txBody>
+      </p:sp>
+    </p:spTree>
+    <p:extLst>
+      <p:ext uri="{BB962C8B-B14F-4D97-AF65-F5344CB8AC3E}">
+        <p14:creationId xmlns:p14="http://schemas.microsoft.com/office/powerpoint/2010/main" val="2719089117"/>
       </p:ext>
     </p:extLst>
   </p:cSld>
@@ -7527,7 +8742,7 @@
             </a:r>
             <a:r>
               <a:rPr lang="en-US" sz="1800" dirty="0"/>
-              <a:t> Impostor Keaton picked by black color wins by voting</a:t>
+              <a:t> Impostor Keaton picked black color </a:t>
             </a:r>
           </a:p>
         </p:txBody>

</xml_diff>